<commit_message>
Aqui está o PP sem a parte da unicer
</commit_message>
<xml_diff>
--- a/5 Principais Industrias Transformadoras do Porto.pptx
+++ b/5 Principais Industrias Transformadoras do Porto.pptx
@@ -5,14 +5,20 @@
     <p:sldMasterId id="2147483648" r:id="rId1"/>
   </p:sldMasterIdLst>
   <p:notesMasterIdLst>
-    <p:notesMasterId r:id="rId7"/>
+    <p:notesMasterId r:id="rId13"/>
   </p:notesMasterIdLst>
   <p:sldIdLst>
     <p:sldId id="256" r:id="rId2"/>
     <p:sldId id="257" r:id="rId3"/>
     <p:sldId id="259" r:id="rId4"/>
     <p:sldId id="258" r:id="rId5"/>
-    <p:sldId id="260" r:id="rId6"/>
+    <p:sldId id="261" r:id="rId6"/>
+    <p:sldId id="262" r:id="rId7"/>
+    <p:sldId id="263" r:id="rId8"/>
+    <p:sldId id="264" r:id="rId9"/>
+    <p:sldId id="265" r:id="rId10"/>
+    <p:sldId id="266" r:id="rId11"/>
+    <p:sldId id="260" r:id="rId12"/>
   </p:sldIdLst>
   <p:sldSz cx="9144000" cy="6858000" type="screen4x3"/>
   <p:notesSz cx="6858000" cy="9144000"/>
@@ -111,7 +117,27 @@
       </a:defRPr>
     </a:lvl9pPr>
   </p:defaultTextStyle>
+  <p:extLst>
+    <p:ext uri="{EFAFB233-063F-42B5-8137-9DF3F51BA10A}">
+      <p15:sldGuideLst xmlns:p15="http://schemas.microsoft.com/office/powerpoint/2012/main">
+        <p15:guide id="1" orient="horz" pos="2160">
+          <p15:clr>
+            <a:srgbClr val="A4A3A4"/>
+          </p15:clr>
+        </p15:guide>
+        <p15:guide id="2" pos="2880">
+          <p15:clr>
+            <a:srgbClr val="A4A3A4"/>
+          </p15:clr>
+        </p15:guide>
+      </p15:sldGuideLst>
+    </p:ext>
+  </p:extLst>
 </p:presentation>
+</file>
+
+<file path=ppt/revisionInfo.xml><?xml version="1.0" encoding="utf-8"?>
+<p1510:revInfo xmlns:a="http://schemas.openxmlformats.org/drawingml/2006/main" xmlns:r="http://schemas.openxmlformats.org/officeDocument/2006/relationships" xmlns:p1510="http://schemas.microsoft.com/office/powerpoint/2015/10/main"/>
 </file>
 
 <file path=ppt/diagrams/colors1.xml><?xml version="1.0" encoding="utf-8"?>
@@ -925,7 +951,7 @@
 <dgm:dataModel xmlns:dgm="http://schemas.openxmlformats.org/drawingml/2006/diagram" xmlns:a="http://schemas.openxmlformats.org/drawingml/2006/main">
   <dgm:ptLst>
     <dgm:pt modelId="{F4AE52FF-2A7B-411C-ACA4-C3BABCE5C987}" type="doc">
-      <dgm:prSet loTypeId="urn:microsoft.com/office/officeart/2005/8/layout/hProcess9" loCatId="process" qsTypeId="urn:microsoft.com/office/officeart/2005/8/quickstyle/3d2" qsCatId="3D" csTypeId="urn:microsoft.com/office/officeart/2005/8/colors/accent0_1" csCatId="mainScheme" phldr="1"/>
+      <dgm:prSet loTypeId="urn:microsoft.com/office/officeart/2005/8/layout/process1" loCatId="process" qsTypeId="urn:microsoft.com/office/officeart/2005/8/quickstyle/3d2#1" qsCatId="3D" csTypeId="urn:microsoft.com/office/officeart/2005/8/colors/accent0_1" csCatId="mainScheme" phldr="1"/>
       <dgm:spPr/>
     </dgm:pt>
     <dgm:pt modelId="{86EEEAEF-7857-4A7A-AC40-828FBF10CAF3}">
@@ -936,7 +962,7 @@
         <a:lstStyle/>
         <a:p>
           <a:r>
-            <a:rPr lang="pt-PT" sz="2000" b="1" dirty="0" smtClean="0">
+            <a:rPr lang="pt-PT" sz="2000" b="1" dirty="0">
               <a:latin typeface="Times New Roman" pitchFamily="18" charset="0"/>
               <a:ea typeface="NSimSun" pitchFamily="49" charset="-122"/>
               <a:cs typeface="Times New Roman" pitchFamily="18" charset="0"/>
@@ -944,18 +970,13 @@
             <a:t>Matérias-primas </a:t>
           </a:r>
           <a:r>
-            <a:rPr lang="pt-PT" sz="1500" dirty="0" smtClean="0">
+            <a:rPr lang="pt-PT" sz="1500" dirty="0">
               <a:latin typeface="Times New Roman" pitchFamily="18" charset="0"/>
               <a:ea typeface="NSimSun" pitchFamily="49" charset="-122"/>
               <a:cs typeface="Times New Roman" pitchFamily="18" charset="0"/>
             </a:rPr>
             <a:t>          (inclui materiais usados)</a:t>
           </a:r>
-          <a:endParaRPr lang="pt-PT" sz="1500" dirty="0">
-            <a:latin typeface="Times New Roman" pitchFamily="18" charset="0"/>
-            <a:ea typeface="NSimSun" pitchFamily="49" charset="-122"/>
-            <a:cs typeface="Times New Roman" pitchFamily="18" charset="0"/>
-          </a:endParaRPr>
         </a:p>
       </dgm:t>
     </dgm:pt>
@@ -989,42 +1010,21 @@
         <a:lstStyle/>
         <a:p>
           <a:r>
-            <a:rPr lang="pt-PT" sz="1600" b="1" dirty="0" smtClean="0">
+            <a:rPr lang="pt-PT" sz="1500" b="1" dirty="0">
               <a:latin typeface="Times New Roman" pitchFamily="18" charset="0"/>
               <a:ea typeface="NSimSun" pitchFamily="49" charset="-122"/>
               <a:cs typeface="Times New Roman" pitchFamily="18" charset="0"/>
             </a:rPr>
-            <a:t>INDUSTRIA TRANSFORMADORA </a:t>
+            <a:t>INDÚSTRIA TRANSFORMADORA </a:t>
           </a:r>
           <a:r>
-            <a:rPr lang="pt-PT" sz="1500" dirty="0" smtClean="0">
+            <a:rPr lang="pt-PT" sz="1500" dirty="0">
               <a:latin typeface="Times New Roman" pitchFamily="18" charset="0"/>
               <a:ea typeface="NSimSun" pitchFamily="49" charset="-122"/>
               <a:cs typeface="Times New Roman" pitchFamily="18" charset="0"/>
             </a:rPr>
-            <a:t>(processos de transformação químico, mecânicos, </a:t>
+            <a:t>(processos químicos, mecânicos, etc.)</a:t>
           </a:r>
-          <a:r>
-            <a:rPr lang="pt-PT" sz="1500" dirty="0" err="1" smtClean="0">
-              <a:latin typeface="Times New Roman" pitchFamily="18" charset="0"/>
-              <a:ea typeface="NSimSun" pitchFamily="49" charset="-122"/>
-              <a:cs typeface="Times New Roman" pitchFamily="18" charset="0"/>
-            </a:rPr>
-            <a:t>etc</a:t>
-          </a:r>
-          <a:r>
-            <a:rPr lang="pt-PT" sz="1500" dirty="0" smtClean="0">
-              <a:latin typeface="Times New Roman" pitchFamily="18" charset="0"/>
-              <a:ea typeface="NSimSun" pitchFamily="49" charset="-122"/>
-              <a:cs typeface="Times New Roman" pitchFamily="18" charset="0"/>
-            </a:rPr>
-            <a:t>)</a:t>
-          </a:r>
-          <a:endParaRPr lang="pt-PT" sz="1500" dirty="0">
-            <a:latin typeface="Times New Roman" pitchFamily="18" charset="0"/>
-            <a:ea typeface="NSimSun" pitchFamily="49" charset="-122"/>
-            <a:cs typeface="Times New Roman" pitchFamily="18" charset="0"/>
-          </a:endParaRPr>
         </a:p>
       </dgm:t>
     </dgm:pt>
@@ -1058,18 +1058,13 @@
         <a:lstStyle/>
         <a:p>
           <a:r>
-            <a:rPr lang="pt-PT" sz="2000" b="1" dirty="0" smtClean="0">
+            <a:rPr lang="pt-PT" sz="2000" b="1" dirty="0">
               <a:latin typeface="Times New Roman" pitchFamily="18" charset="0"/>
               <a:ea typeface="NSimSun" pitchFamily="49" charset="-122"/>
               <a:cs typeface="Times New Roman" pitchFamily="18" charset="0"/>
             </a:rPr>
             <a:t>Novos Produtos</a:t>
           </a:r>
-          <a:endParaRPr lang="pt-PT" sz="2000" b="1" dirty="0">
-            <a:latin typeface="Times New Roman" pitchFamily="18" charset="0"/>
-            <a:ea typeface="NSimSun" pitchFamily="49" charset="-122"/>
-            <a:cs typeface="Times New Roman" pitchFamily="18" charset="0"/>
-          </a:endParaRPr>
         </a:p>
       </dgm:t>
     </dgm:pt>
@@ -1095,8 +1090,8 @@
         </a:p>
       </dgm:t>
     </dgm:pt>
-    <dgm:pt modelId="{984A4423-F860-4858-8EC9-F8EB389BB10D}" type="pres">
-      <dgm:prSet presAssocID="{F4AE52FF-2A7B-411C-ACA4-C3BABCE5C987}" presName="CompostProcess" presStyleCnt="0">
+    <dgm:pt modelId="{07227BD3-629E-4BB9-9CAC-CEE3EC2ADDD9}" type="pres">
+      <dgm:prSet presAssocID="{F4AE52FF-2A7B-411C-ACA4-C3BABCE5C987}" presName="Name0" presStyleCnt="0">
         <dgm:presLayoutVars>
           <dgm:dir/>
           <dgm:resizeHandles val="exact"/>
@@ -1104,195 +1099,99 @@
       </dgm:prSet>
       <dgm:spPr/>
     </dgm:pt>
-    <dgm:pt modelId="{7CA3380D-C8B2-4B50-B8B0-A68E3A83E212}" type="pres">
-      <dgm:prSet presAssocID="{F4AE52FF-2A7B-411C-ACA4-C3BABCE5C987}" presName="arrow" presStyleLbl="bgShp" presStyleIdx="0" presStyleCnt="1"/>
-      <dgm:spPr/>
-    </dgm:pt>
-    <dgm:pt modelId="{5090B592-E8E5-4805-9589-D1E1E5518E9E}" type="pres">
-      <dgm:prSet presAssocID="{F4AE52FF-2A7B-411C-ACA4-C3BABCE5C987}" presName="linearProcess" presStyleCnt="0"/>
-      <dgm:spPr/>
-    </dgm:pt>
-    <dgm:pt modelId="{A3EE2BEA-3E11-4BC8-A57A-634560AF8317}" type="pres">
-      <dgm:prSet presAssocID="{86EEEAEF-7857-4A7A-AC40-828FBF10CAF3}" presName="textNode" presStyleLbl="node1" presStyleIdx="0" presStyleCnt="3">
+    <dgm:pt modelId="{9F1625F4-44D6-478F-A204-8EFFE93223C0}" type="pres">
+      <dgm:prSet presAssocID="{86EEEAEF-7857-4A7A-AC40-828FBF10CAF3}" presName="node" presStyleLbl="node1" presStyleIdx="0" presStyleCnt="3">
         <dgm:presLayoutVars>
           <dgm:bulletEnabled val="1"/>
         </dgm:presLayoutVars>
       </dgm:prSet>
       <dgm:spPr/>
-      <dgm:t>
-        <a:bodyPr/>
-        <a:lstStyle/>
-        <a:p>
-          <a:endParaRPr lang="pt-PT"/>
-        </a:p>
-      </dgm:t>
     </dgm:pt>
-    <dgm:pt modelId="{9A222B0F-C65C-4C46-9DF4-51F74F7DCBCF}" type="pres">
-      <dgm:prSet presAssocID="{4AD6F956-FA89-465B-8481-1E11D7DEED98}" presName="sibTrans" presStyleCnt="0"/>
+    <dgm:pt modelId="{D300BBFC-A5B2-40C8-84F6-3687783F2299}" type="pres">
+      <dgm:prSet presAssocID="{4AD6F956-FA89-465B-8481-1E11D7DEED98}" presName="sibTrans" presStyleLbl="sibTrans2D1" presStyleIdx="0" presStyleCnt="2"/>
       <dgm:spPr/>
     </dgm:pt>
-    <dgm:pt modelId="{24263FAA-5A18-49EE-9FEB-7B33F7320F04}" type="pres">
-      <dgm:prSet presAssocID="{A711A624-083C-45DA-860E-ECBDF2A19332}" presName="textNode" presStyleLbl="node1" presStyleIdx="1" presStyleCnt="3" custScaleY="125756">
+    <dgm:pt modelId="{E0EE4200-4F32-4475-BC70-DF73BE85F871}" type="pres">
+      <dgm:prSet presAssocID="{4AD6F956-FA89-465B-8481-1E11D7DEED98}" presName="connectorText" presStyleLbl="sibTrans2D1" presStyleIdx="0" presStyleCnt="2"/>
+      <dgm:spPr/>
+    </dgm:pt>
+    <dgm:pt modelId="{B6DD54AF-B491-4292-98A4-FAD8F002B107}" type="pres">
+      <dgm:prSet presAssocID="{A711A624-083C-45DA-860E-ECBDF2A19332}" presName="node" presStyleLbl="node1" presStyleIdx="1" presStyleCnt="3">
         <dgm:presLayoutVars>
           <dgm:bulletEnabled val="1"/>
         </dgm:presLayoutVars>
       </dgm:prSet>
       <dgm:spPr/>
-      <dgm:t>
-        <a:bodyPr/>
-        <a:lstStyle/>
-        <a:p>
-          <a:endParaRPr lang="pt-PT"/>
-        </a:p>
-      </dgm:t>
     </dgm:pt>
-    <dgm:pt modelId="{95973B27-20FF-48F5-A044-84810B956104}" type="pres">
-      <dgm:prSet presAssocID="{CD1BD827-0B8A-4437-8557-F23E8D40DB1B}" presName="sibTrans" presStyleCnt="0"/>
+    <dgm:pt modelId="{D26F475F-D04E-4E20-9311-BA9B6E3CC8AE}" type="pres">
+      <dgm:prSet presAssocID="{CD1BD827-0B8A-4437-8557-F23E8D40DB1B}" presName="sibTrans" presStyleLbl="sibTrans2D1" presStyleIdx="1" presStyleCnt="2"/>
       <dgm:spPr/>
     </dgm:pt>
-    <dgm:pt modelId="{A3923421-BCAE-43E7-9169-730A02673808}" type="pres">
-      <dgm:prSet presAssocID="{25755C1F-7F43-4838-861A-B4AD209E0985}" presName="textNode" presStyleLbl="node1" presStyleIdx="2" presStyleCnt="3">
+    <dgm:pt modelId="{217E4184-A687-43D8-86E1-6D84782F7EB2}" type="pres">
+      <dgm:prSet presAssocID="{CD1BD827-0B8A-4437-8557-F23E8D40DB1B}" presName="connectorText" presStyleLbl="sibTrans2D1" presStyleIdx="1" presStyleCnt="2"/>
+      <dgm:spPr/>
+    </dgm:pt>
+    <dgm:pt modelId="{E2977B89-8593-45BD-9BA3-682EBE2257F4}" type="pres">
+      <dgm:prSet presAssocID="{25755C1F-7F43-4838-861A-B4AD209E0985}" presName="node" presStyleLbl="node1" presStyleIdx="2" presStyleCnt="3">
         <dgm:presLayoutVars>
           <dgm:bulletEnabled val="1"/>
         </dgm:presLayoutVars>
       </dgm:prSet>
       <dgm:spPr/>
-      <dgm:t>
-        <a:bodyPr/>
-        <a:lstStyle/>
-        <a:p>
-          <a:endParaRPr lang="pt-PT"/>
-        </a:p>
-      </dgm:t>
     </dgm:pt>
   </dgm:ptLst>
   <dgm:cxnLst>
+    <dgm:cxn modelId="{9064440D-1CA5-42A0-942E-711B3B84009B}" type="presOf" srcId="{4AD6F956-FA89-465B-8481-1E11D7DEED98}" destId="{E0EE4200-4F32-4475-BC70-DF73BE85F871}" srcOrd="1" destOrd="0" presId="urn:microsoft.com/office/officeart/2005/8/layout/process1"/>
+    <dgm:cxn modelId="{7D310538-AD69-4977-A238-5E393FB322C4}" type="presOf" srcId="{F4AE52FF-2A7B-411C-ACA4-C3BABCE5C987}" destId="{07227BD3-629E-4BB9-9CAC-CEE3EC2ADDD9}" srcOrd="0" destOrd="0" presId="urn:microsoft.com/office/officeart/2005/8/layout/process1"/>
     <dgm:cxn modelId="{BAC0E83A-AA87-46BC-BC75-E25A2767B5B4}" srcId="{F4AE52FF-2A7B-411C-ACA4-C3BABCE5C987}" destId="{86EEEAEF-7857-4A7A-AC40-828FBF10CAF3}" srcOrd="0" destOrd="0" parTransId="{53DBAF0F-15DA-45F1-80D7-D3A5989916A3}" sibTransId="{4AD6F956-FA89-465B-8481-1E11D7DEED98}"/>
+    <dgm:cxn modelId="{194FAE3C-ED5A-4F6A-AA58-157752327660}" type="presOf" srcId="{86EEEAEF-7857-4A7A-AC40-828FBF10CAF3}" destId="{9F1625F4-44D6-478F-A204-8EFFE93223C0}" srcOrd="0" destOrd="0" presId="urn:microsoft.com/office/officeart/2005/8/layout/process1"/>
+    <dgm:cxn modelId="{83FF6B5D-7C31-4ADE-83C5-D6CC68C0A2F9}" type="presOf" srcId="{CD1BD827-0B8A-4437-8557-F23E8D40DB1B}" destId="{D26F475F-D04E-4E20-9311-BA9B6E3CC8AE}" srcOrd="0" destOrd="0" presId="urn:microsoft.com/office/officeart/2005/8/layout/process1"/>
+    <dgm:cxn modelId="{805A7D7D-51B6-411F-9BA0-7FF6368A0D06}" type="presOf" srcId="{4AD6F956-FA89-465B-8481-1E11D7DEED98}" destId="{D300BBFC-A5B2-40C8-84F6-3687783F2299}" srcOrd="0" destOrd="0" presId="urn:microsoft.com/office/officeart/2005/8/layout/process1"/>
+    <dgm:cxn modelId="{4DBD7799-CD00-4E2B-8372-50C400F1493B}" srcId="{F4AE52FF-2A7B-411C-ACA4-C3BABCE5C987}" destId="{A711A624-083C-45DA-860E-ECBDF2A19332}" srcOrd="1" destOrd="0" parTransId="{02CF200B-7EC6-450F-8127-30E6559D260B}" sibTransId="{CD1BD827-0B8A-4437-8557-F23E8D40DB1B}"/>
+    <dgm:cxn modelId="{DCC913A5-6D9F-4EBC-A61C-BB104CD9A7ED}" type="presOf" srcId="{A711A624-083C-45DA-860E-ECBDF2A19332}" destId="{B6DD54AF-B491-4292-98A4-FAD8F002B107}" srcOrd="0" destOrd="0" presId="urn:microsoft.com/office/officeart/2005/8/layout/process1"/>
     <dgm:cxn modelId="{403AC6B0-B012-48AC-9ADA-CA2BA940B828}" srcId="{F4AE52FF-2A7B-411C-ACA4-C3BABCE5C987}" destId="{25755C1F-7F43-4838-861A-B4AD209E0985}" srcOrd="2" destOrd="0" parTransId="{AE85BEE2-35F5-4F84-9AF0-58223A0ACE20}" sibTransId="{C124BD5B-F7AB-4F2F-B55F-F064297AE55E}"/>
-    <dgm:cxn modelId="{4F0515E6-D5C0-4079-B4D9-7A83D14E2EED}" type="presOf" srcId="{25755C1F-7F43-4838-861A-B4AD209E0985}" destId="{A3923421-BCAE-43E7-9169-730A02673808}" srcOrd="0" destOrd="0" presId="urn:microsoft.com/office/officeart/2005/8/layout/hProcess9"/>
-    <dgm:cxn modelId="{4DBD7799-CD00-4E2B-8372-50C400F1493B}" srcId="{F4AE52FF-2A7B-411C-ACA4-C3BABCE5C987}" destId="{A711A624-083C-45DA-860E-ECBDF2A19332}" srcOrd="1" destOrd="0" parTransId="{02CF200B-7EC6-450F-8127-30E6559D260B}" sibTransId="{CD1BD827-0B8A-4437-8557-F23E8D40DB1B}"/>
-    <dgm:cxn modelId="{9748DBDC-35BB-4BC0-9B90-F6B128B086C5}" type="presOf" srcId="{A711A624-083C-45DA-860E-ECBDF2A19332}" destId="{24263FAA-5A18-49EE-9FEB-7B33F7320F04}" srcOrd="0" destOrd="0" presId="urn:microsoft.com/office/officeart/2005/8/layout/hProcess9"/>
-    <dgm:cxn modelId="{63128BD7-725A-4B70-8EC0-A93FD6CC9BD5}" type="presOf" srcId="{86EEEAEF-7857-4A7A-AC40-828FBF10CAF3}" destId="{A3EE2BEA-3E11-4BC8-A57A-634560AF8317}" srcOrd="0" destOrd="0" presId="urn:microsoft.com/office/officeart/2005/8/layout/hProcess9"/>
-    <dgm:cxn modelId="{DE3A4DF4-B016-4004-BF92-450F4F969934}" type="presOf" srcId="{F4AE52FF-2A7B-411C-ACA4-C3BABCE5C987}" destId="{984A4423-F860-4858-8EC9-F8EB389BB10D}" srcOrd="0" destOrd="0" presId="urn:microsoft.com/office/officeart/2005/8/layout/hProcess9"/>
-    <dgm:cxn modelId="{48A7B3BB-2A6D-489B-B0D3-32673B519B13}" type="presParOf" srcId="{984A4423-F860-4858-8EC9-F8EB389BB10D}" destId="{7CA3380D-C8B2-4B50-B8B0-A68E3A83E212}" srcOrd="0" destOrd="0" presId="urn:microsoft.com/office/officeart/2005/8/layout/hProcess9"/>
-    <dgm:cxn modelId="{55A789DC-B5FF-40A2-A2DC-18744239DA46}" type="presParOf" srcId="{984A4423-F860-4858-8EC9-F8EB389BB10D}" destId="{5090B592-E8E5-4805-9589-D1E1E5518E9E}" srcOrd="1" destOrd="0" presId="urn:microsoft.com/office/officeart/2005/8/layout/hProcess9"/>
-    <dgm:cxn modelId="{EAA9B22A-C359-4FF0-ABB1-52A0BF4A91D0}" type="presParOf" srcId="{5090B592-E8E5-4805-9589-D1E1E5518E9E}" destId="{A3EE2BEA-3E11-4BC8-A57A-634560AF8317}" srcOrd="0" destOrd="0" presId="urn:microsoft.com/office/officeart/2005/8/layout/hProcess9"/>
-    <dgm:cxn modelId="{9E5AD6A6-5FC2-4F59-BC92-DEBBA58D64F5}" type="presParOf" srcId="{5090B592-E8E5-4805-9589-D1E1E5518E9E}" destId="{9A222B0F-C65C-4C46-9DF4-51F74F7DCBCF}" srcOrd="1" destOrd="0" presId="urn:microsoft.com/office/officeart/2005/8/layout/hProcess9"/>
-    <dgm:cxn modelId="{773ED8AF-12B6-43D6-9206-22190A67EFA2}" type="presParOf" srcId="{5090B592-E8E5-4805-9589-D1E1E5518E9E}" destId="{24263FAA-5A18-49EE-9FEB-7B33F7320F04}" srcOrd="2" destOrd="0" presId="urn:microsoft.com/office/officeart/2005/8/layout/hProcess9"/>
-    <dgm:cxn modelId="{C225AA89-A5D7-44B3-9BA8-FAAF7952D455}" type="presParOf" srcId="{5090B592-E8E5-4805-9589-D1E1E5518E9E}" destId="{95973B27-20FF-48F5-A044-84810B956104}" srcOrd="3" destOrd="0" presId="urn:microsoft.com/office/officeart/2005/8/layout/hProcess9"/>
-    <dgm:cxn modelId="{C288007B-C027-45F5-AD1B-B498415700D5}" type="presParOf" srcId="{5090B592-E8E5-4805-9589-D1E1E5518E9E}" destId="{A3923421-BCAE-43E7-9169-730A02673808}" srcOrd="4" destOrd="0" presId="urn:microsoft.com/office/officeart/2005/8/layout/hProcess9"/>
+    <dgm:cxn modelId="{E7EDC5C2-3979-47FC-954A-D8089184660A}" type="presOf" srcId="{25755C1F-7F43-4838-861A-B4AD209E0985}" destId="{E2977B89-8593-45BD-9BA3-682EBE2257F4}" srcOrd="0" destOrd="0" presId="urn:microsoft.com/office/officeart/2005/8/layout/process1"/>
+    <dgm:cxn modelId="{C2CB70E1-8FB8-4FCA-BA37-C8927651F52D}" type="presOf" srcId="{CD1BD827-0B8A-4437-8557-F23E8D40DB1B}" destId="{217E4184-A687-43D8-86E1-6D84782F7EB2}" srcOrd="1" destOrd="0" presId="urn:microsoft.com/office/officeart/2005/8/layout/process1"/>
+    <dgm:cxn modelId="{975FF414-AC8A-4C19-B2B9-03ABEA47F16E}" type="presParOf" srcId="{07227BD3-629E-4BB9-9CAC-CEE3EC2ADDD9}" destId="{9F1625F4-44D6-478F-A204-8EFFE93223C0}" srcOrd="0" destOrd="0" presId="urn:microsoft.com/office/officeart/2005/8/layout/process1"/>
+    <dgm:cxn modelId="{5EA50225-8170-4540-970B-ABC98E2FC85F}" type="presParOf" srcId="{07227BD3-629E-4BB9-9CAC-CEE3EC2ADDD9}" destId="{D300BBFC-A5B2-40C8-84F6-3687783F2299}" srcOrd="1" destOrd="0" presId="urn:microsoft.com/office/officeart/2005/8/layout/process1"/>
+    <dgm:cxn modelId="{5F4401FD-CD26-426D-A126-3C560E173650}" type="presParOf" srcId="{D300BBFC-A5B2-40C8-84F6-3687783F2299}" destId="{E0EE4200-4F32-4475-BC70-DF73BE85F871}" srcOrd="0" destOrd="0" presId="urn:microsoft.com/office/officeart/2005/8/layout/process1"/>
+    <dgm:cxn modelId="{516FD00E-38FD-4E1D-8778-D427797E4DB8}" type="presParOf" srcId="{07227BD3-629E-4BB9-9CAC-CEE3EC2ADDD9}" destId="{B6DD54AF-B491-4292-98A4-FAD8F002B107}" srcOrd="2" destOrd="0" presId="urn:microsoft.com/office/officeart/2005/8/layout/process1"/>
+    <dgm:cxn modelId="{1F3DDE92-3C12-4F5A-8440-171E4EBB6B3B}" type="presParOf" srcId="{07227BD3-629E-4BB9-9CAC-CEE3EC2ADDD9}" destId="{D26F475F-D04E-4E20-9311-BA9B6E3CC8AE}" srcOrd="3" destOrd="0" presId="urn:microsoft.com/office/officeart/2005/8/layout/process1"/>
+    <dgm:cxn modelId="{6137C748-AF5E-48B9-870F-88D7DB879B39}" type="presParOf" srcId="{D26F475F-D04E-4E20-9311-BA9B6E3CC8AE}" destId="{217E4184-A687-43D8-86E1-6D84782F7EB2}" srcOrd="0" destOrd="0" presId="urn:microsoft.com/office/officeart/2005/8/layout/process1"/>
+    <dgm:cxn modelId="{2F058F2F-8110-4FEB-BA8A-97A112A0B344}" type="presParOf" srcId="{07227BD3-629E-4BB9-9CAC-CEE3EC2ADDD9}" destId="{E2977B89-8593-45BD-9BA3-682EBE2257F4}" srcOrd="4" destOrd="0" presId="urn:microsoft.com/office/officeart/2005/8/layout/process1"/>
   </dgm:cxnLst>
   <dgm:bg/>
   <dgm:whole/>
   <dgm:extLst>
     <a:ext uri="http://schemas.microsoft.com/office/drawing/2008/diagram">
-      <dsp:dataModelExt xmlns:dsp="http://schemas.microsoft.com/office/drawing/2008/diagram" xmlns="" relId="rId7" minVer="http://schemas.openxmlformats.org/drawingml/2006/diagram"/>
+      <dsp:dataModelExt xmlns:dsp="http://schemas.microsoft.com/office/drawing/2008/diagram" relId="rId7" minVer="http://schemas.openxmlformats.org/drawingml/2006/diagram"/>
     </a:ext>
   </dgm:extLst>
 </dgm:dataModel>
 </file>
 
 <file path=ppt/diagrams/drawing1.xml><?xml version="1.0" encoding="utf-8"?>
-<dsp:drawing xmlns:dgm="http://schemas.openxmlformats.org/drawingml/2006/diagram" xmlns:a="http://schemas.openxmlformats.org/drawingml/2006/main" xmlns:dsp="http://schemas.microsoft.com/office/drawing/2008/diagram">
+<dsp:drawing xmlns:dgm="http://schemas.openxmlformats.org/drawingml/2006/diagram" xmlns:dsp="http://schemas.microsoft.com/office/drawing/2008/diagram" xmlns:a="http://schemas.openxmlformats.org/drawingml/2006/main">
   <dsp:spTree>
     <dsp:nvGrpSpPr>
       <dsp:cNvPr id="0" name=""/>
       <dsp:cNvGrpSpPr/>
     </dsp:nvGrpSpPr>
     <dsp:grpSpPr/>
-    <dsp:sp modelId="{7CA3380D-C8B2-4B50-B8B0-A68E3A83E212}">
+    <dsp:sp modelId="{9F1625F4-44D6-478F-A204-8EFFE93223C0}">
       <dsp:nvSpPr>
         <dsp:cNvPr id="0" name=""/>
         <dsp:cNvSpPr/>
       </dsp:nvSpPr>
       <dsp:spPr>
         <a:xfrm>
-          <a:off x="626469" y="0"/>
-          <a:ext cx="7099988" cy="2608064"/>
-        </a:xfrm>
-        <a:prstGeom prst="rightArrow">
-          <a:avLst/>
-        </a:prstGeom>
-        <a:gradFill rotWithShape="0">
-          <a:gsLst>
-            <a:gs pos="0">
-              <a:schemeClr val="dk1">
-                <a:tint val="40000"/>
-                <a:hueOff val="0"/>
-                <a:satOff val="0"/>
-                <a:lumOff val="0"/>
-                <a:alphaOff val="0"/>
-                <a:shade val="51000"/>
-                <a:satMod val="130000"/>
-              </a:schemeClr>
-            </a:gs>
-            <a:gs pos="80000">
-              <a:schemeClr val="dk1">
-                <a:tint val="40000"/>
-                <a:hueOff val="0"/>
-                <a:satOff val="0"/>
-                <a:lumOff val="0"/>
-                <a:alphaOff val="0"/>
-                <a:shade val="93000"/>
-                <a:satMod val="130000"/>
-              </a:schemeClr>
-            </a:gs>
-            <a:gs pos="100000">
-              <a:schemeClr val="dk1">
-                <a:tint val="40000"/>
-                <a:hueOff val="0"/>
-                <a:satOff val="0"/>
-                <a:lumOff val="0"/>
-                <a:alphaOff val="0"/>
-                <a:shade val="94000"/>
-                <a:satMod val="135000"/>
-              </a:schemeClr>
-            </a:gs>
-          </a:gsLst>
-          <a:lin ang="16200000" scaled="0"/>
-        </a:gradFill>
-        <a:ln>
-          <a:noFill/>
-        </a:ln>
-        <a:effectLst/>
-        <a:scene3d>
-          <a:camera prst="orthographicFront"/>
-          <a:lightRig rig="threePt" dir="t">
-            <a:rot lat="0" lon="0" rev="7500000"/>
-          </a:lightRig>
-        </a:scene3d>
-        <a:sp3d z="-152400" extrusionH="63500" prstMaterial="matte">
-          <a:bevelT w="144450" h="6350" prst="relaxedInset"/>
-          <a:contourClr>
-            <a:schemeClr val="bg1"/>
-          </a:contourClr>
-        </a:sp3d>
-      </dsp:spPr>
-      <dsp:style>
-        <a:lnRef idx="0">
-          <a:scrgbClr r="0" g="0" b="0"/>
-        </a:lnRef>
-        <a:fillRef idx="3">
-          <a:scrgbClr r="0" g="0" b="0"/>
-        </a:fillRef>
-        <a:effectRef idx="0">
-          <a:scrgbClr r="0" g="0" b="0"/>
-        </a:effectRef>
-        <a:fontRef idx="minor"/>
-      </dsp:style>
-    </dsp:sp>
-    <dsp:sp modelId="{A3EE2BEA-3E11-4BC8-A57A-634560AF8317}">
-      <dsp:nvSpPr>
-        <dsp:cNvPr id="0" name=""/>
-        <dsp:cNvSpPr/>
-      </dsp:nvSpPr>
-      <dsp:spPr>
-        <a:xfrm>
-          <a:off x="0" y="782419"/>
-          <a:ext cx="2505878" cy="1043225"/>
+          <a:off x="7341" y="645749"/>
+          <a:ext cx="2194275" cy="1316565"/>
         </a:xfrm>
         <a:prstGeom prst="roundRect">
-          <a:avLst/>
+          <a:avLst>
+            <a:gd name="adj" fmla="val 10000"/>
+          </a:avLst>
         </a:prstGeom>
         <a:gradFill rotWithShape="0">
           <a:gsLst>
@@ -1369,7 +1268,7 @@
         </a:bodyPr>
         <a:lstStyle/>
         <a:p>
-          <a:pPr lvl="0" algn="ctr" defTabSz="889000">
+          <a:pPr marL="0" lvl="0" indent="0" algn="ctr" defTabSz="889000">
             <a:lnSpc>
               <a:spcPct val="90000"/>
             </a:lnSpc>
@@ -1379,9 +1278,10 @@
             <a:spcAft>
               <a:spcPct val="35000"/>
             </a:spcAft>
+            <a:buNone/>
           </a:pPr>
           <a:r>
-            <a:rPr lang="pt-PT" sz="2000" b="1" kern="1200" dirty="0" smtClean="0">
+            <a:rPr lang="pt-PT" sz="2000" b="1" kern="1200" dirty="0">
               <a:latin typeface="Times New Roman" pitchFamily="18" charset="0"/>
               <a:ea typeface="NSimSun" pitchFamily="49" charset="-122"/>
               <a:cs typeface="Times New Roman" pitchFamily="18" charset="0"/>
@@ -1389,37 +1289,122 @@
             <a:t>Matérias-primas </a:t>
           </a:r>
           <a:r>
-            <a:rPr lang="pt-PT" sz="1500" kern="1200" dirty="0" smtClean="0">
+            <a:rPr lang="pt-PT" sz="1500" kern="1200" dirty="0">
               <a:latin typeface="Times New Roman" pitchFamily="18" charset="0"/>
               <a:ea typeface="NSimSun" pitchFamily="49" charset="-122"/>
               <a:cs typeface="Times New Roman" pitchFamily="18" charset="0"/>
             </a:rPr>
             <a:t>          (inclui materiais usados)</a:t>
           </a:r>
-          <a:endParaRPr lang="pt-PT" sz="1500" kern="1200" dirty="0">
-            <a:latin typeface="Times New Roman" pitchFamily="18" charset="0"/>
-            <a:ea typeface="NSimSun" pitchFamily="49" charset="-122"/>
-            <a:cs typeface="Times New Roman" pitchFamily="18" charset="0"/>
-          </a:endParaRPr>
         </a:p>
       </dsp:txBody>
       <dsp:txXfrm>
-        <a:off x="0" y="782419"/>
-        <a:ext cx="2505878" cy="1043225"/>
+        <a:off x="45902" y="684310"/>
+        <a:ext cx="2117153" cy="1239443"/>
       </dsp:txXfrm>
     </dsp:sp>
-    <dsp:sp modelId="{24263FAA-5A18-49EE-9FEB-7B33F7320F04}">
+    <dsp:sp modelId="{D300BBFC-A5B2-40C8-84F6-3687783F2299}">
       <dsp:nvSpPr>
         <dsp:cNvPr id="0" name=""/>
         <dsp:cNvSpPr/>
       </dsp:nvSpPr>
       <dsp:spPr>
         <a:xfrm>
-          <a:off x="2923524" y="648072"/>
-          <a:ext cx="2505878" cy="1311918"/>
+          <a:off x="2421043" y="1031941"/>
+          <a:ext cx="465186" cy="544180"/>
+        </a:xfrm>
+        <a:prstGeom prst="rightArrow">
+          <a:avLst>
+            <a:gd name="adj1" fmla="val 60000"/>
+            <a:gd name="adj2" fmla="val 50000"/>
+          </a:avLst>
+        </a:prstGeom>
+        <a:solidFill>
+          <a:schemeClr val="dk1">
+            <a:tint val="60000"/>
+            <a:hueOff val="0"/>
+            <a:satOff val="0"/>
+            <a:lumOff val="0"/>
+            <a:alphaOff val="0"/>
+          </a:schemeClr>
+        </a:solidFill>
+        <a:ln>
+          <a:noFill/>
+        </a:ln>
+        <a:effectLst>
+          <a:outerShdw blurRad="40000" dist="23000" dir="5400000" rotWithShape="0">
+            <a:srgbClr val="000000">
+              <a:alpha val="35000"/>
+            </a:srgbClr>
+          </a:outerShdw>
+        </a:effectLst>
+        <a:scene3d>
+          <a:camera prst="orthographicFront"/>
+          <a:lightRig rig="threePt" dir="t">
+            <a:rot lat="0" lon="0" rev="7500000"/>
+          </a:lightRig>
+        </a:scene3d>
+        <a:sp3d z="-70000" extrusionH="63500" prstMaterial="matte">
+          <a:bevelT w="25400" h="6350" prst="relaxedInset"/>
+          <a:contourClr>
+            <a:schemeClr val="bg1"/>
+          </a:contourClr>
+        </a:sp3d>
+      </dsp:spPr>
+      <dsp:style>
+        <a:lnRef idx="0">
+          <a:scrgbClr r="0" g="0" b="0"/>
+        </a:lnRef>
+        <a:fillRef idx="1">
+          <a:scrgbClr r="0" g="0" b="0"/>
+        </a:fillRef>
+        <a:effectRef idx="2">
+          <a:scrgbClr r="0" g="0" b="0"/>
+        </a:effectRef>
+        <a:fontRef idx="minor">
+          <a:schemeClr val="lt1"/>
+        </a:fontRef>
+      </dsp:style>
+      <dsp:txBody>
+        <a:bodyPr spcFirstLastPara="0" vert="horz" wrap="square" lIns="0" tIns="0" rIns="0" bIns="0" numCol="1" spcCol="1270" anchor="ctr" anchorCtr="0">
+          <a:noAutofit/>
+        </a:bodyPr>
+        <a:lstStyle/>
+        <a:p>
+          <a:pPr marL="0" lvl="0" indent="0" algn="ctr" defTabSz="1022350">
+            <a:lnSpc>
+              <a:spcPct val="90000"/>
+            </a:lnSpc>
+            <a:spcBef>
+              <a:spcPct val="0"/>
+            </a:spcBef>
+            <a:spcAft>
+              <a:spcPct val="35000"/>
+            </a:spcAft>
+            <a:buNone/>
+          </a:pPr>
+          <a:endParaRPr lang="pt-PT" sz="2300" kern="1200"/>
+        </a:p>
+      </dsp:txBody>
+      <dsp:txXfrm>
+        <a:off x="2421043" y="1140777"/>
+        <a:ext cx="325630" cy="326508"/>
+      </dsp:txXfrm>
+    </dsp:sp>
+    <dsp:sp modelId="{B6DD54AF-B491-4292-98A4-FAD8F002B107}">
+      <dsp:nvSpPr>
+        <dsp:cNvPr id="0" name=""/>
+        <dsp:cNvSpPr/>
+      </dsp:nvSpPr>
+      <dsp:spPr>
+        <a:xfrm>
+          <a:off x="3079326" y="645749"/>
+          <a:ext cx="2194275" cy="1316565"/>
         </a:xfrm>
         <a:prstGeom prst="roundRect">
-          <a:avLst/>
+          <a:avLst>
+            <a:gd name="adj" fmla="val 10000"/>
+          </a:avLst>
         </a:prstGeom>
         <a:gradFill rotWithShape="0">
           <a:gsLst>
@@ -1491,12 +1476,12 @@
         </a:fontRef>
       </dsp:style>
       <dsp:txBody>
-        <a:bodyPr spcFirstLastPara="0" vert="horz" wrap="square" lIns="60960" tIns="60960" rIns="60960" bIns="60960" numCol="1" spcCol="1270" anchor="ctr" anchorCtr="0">
+        <a:bodyPr spcFirstLastPara="0" vert="horz" wrap="square" lIns="57150" tIns="57150" rIns="57150" bIns="57150" numCol="1" spcCol="1270" anchor="ctr" anchorCtr="0">
           <a:noAutofit/>
         </a:bodyPr>
         <a:lstStyle/>
         <a:p>
-          <a:pPr lvl="0" algn="ctr" defTabSz="711200">
+          <a:pPr marL="0" lvl="0" indent="0" algn="ctr" defTabSz="666750">
             <a:lnSpc>
               <a:spcPct val="90000"/>
             </a:lnSpc>
@@ -1506,63 +1491,133 @@
             <a:spcAft>
               <a:spcPct val="35000"/>
             </a:spcAft>
+            <a:buNone/>
           </a:pPr>
           <a:r>
-            <a:rPr lang="pt-PT" sz="1600" b="1" kern="1200" dirty="0" smtClean="0">
+            <a:rPr lang="pt-PT" sz="1500" b="1" kern="1200" dirty="0">
               <a:latin typeface="Times New Roman" pitchFamily="18" charset="0"/>
               <a:ea typeface="NSimSun" pitchFamily="49" charset="-122"/>
               <a:cs typeface="Times New Roman" pitchFamily="18" charset="0"/>
             </a:rPr>
-            <a:t>INDUSTRIA TRANSFORMADORA </a:t>
+            <a:t>INDÚSTRIA TRANSFORMADORA </a:t>
           </a:r>
           <a:r>
-            <a:rPr lang="pt-PT" sz="1500" kern="1200" dirty="0" smtClean="0">
+            <a:rPr lang="pt-PT" sz="1500" kern="1200" dirty="0">
               <a:latin typeface="Times New Roman" pitchFamily="18" charset="0"/>
               <a:ea typeface="NSimSun" pitchFamily="49" charset="-122"/>
               <a:cs typeface="Times New Roman" pitchFamily="18" charset="0"/>
             </a:rPr>
-            <a:t>(processos de transformação químico, mecânicos, </a:t>
+            <a:t>(processos químicos, mecânicos, etc.)</a:t>
           </a:r>
-          <a:r>
-            <a:rPr lang="pt-PT" sz="1500" kern="1200" dirty="0" err="1" smtClean="0">
-              <a:latin typeface="Times New Roman" pitchFamily="18" charset="0"/>
-              <a:ea typeface="NSimSun" pitchFamily="49" charset="-122"/>
-              <a:cs typeface="Times New Roman" pitchFamily="18" charset="0"/>
-            </a:rPr>
-            <a:t>etc</a:t>
-          </a:r>
-          <a:r>
-            <a:rPr lang="pt-PT" sz="1500" kern="1200" dirty="0" smtClean="0">
-              <a:latin typeface="Times New Roman" pitchFamily="18" charset="0"/>
-              <a:ea typeface="NSimSun" pitchFamily="49" charset="-122"/>
-              <a:cs typeface="Times New Roman" pitchFamily="18" charset="0"/>
-            </a:rPr>
-            <a:t>)</a:t>
-          </a:r>
-          <a:endParaRPr lang="pt-PT" sz="1500" kern="1200" dirty="0">
-            <a:latin typeface="Times New Roman" pitchFamily="18" charset="0"/>
-            <a:ea typeface="NSimSun" pitchFamily="49" charset="-122"/>
-            <a:cs typeface="Times New Roman" pitchFamily="18" charset="0"/>
-          </a:endParaRPr>
         </a:p>
       </dsp:txBody>
       <dsp:txXfrm>
-        <a:off x="2923524" y="648072"/>
-        <a:ext cx="2505878" cy="1311918"/>
+        <a:off x="3117887" y="684310"/>
+        <a:ext cx="2117153" cy="1239443"/>
       </dsp:txXfrm>
     </dsp:sp>
-    <dsp:sp modelId="{A3923421-BCAE-43E7-9169-730A02673808}">
+    <dsp:sp modelId="{D26F475F-D04E-4E20-9311-BA9B6E3CC8AE}">
       <dsp:nvSpPr>
         <dsp:cNvPr id="0" name=""/>
         <dsp:cNvSpPr/>
       </dsp:nvSpPr>
       <dsp:spPr>
         <a:xfrm>
-          <a:off x="5847049" y="782419"/>
-          <a:ext cx="2505878" cy="1043225"/>
+          <a:off x="5493029" y="1031941"/>
+          <a:ext cx="465186" cy="544180"/>
+        </a:xfrm>
+        <a:prstGeom prst="rightArrow">
+          <a:avLst>
+            <a:gd name="adj1" fmla="val 60000"/>
+            <a:gd name="adj2" fmla="val 50000"/>
+          </a:avLst>
+        </a:prstGeom>
+        <a:solidFill>
+          <a:schemeClr val="dk1">
+            <a:tint val="60000"/>
+            <a:hueOff val="0"/>
+            <a:satOff val="0"/>
+            <a:lumOff val="0"/>
+            <a:alphaOff val="0"/>
+          </a:schemeClr>
+        </a:solidFill>
+        <a:ln>
+          <a:noFill/>
+        </a:ln>
+        <a:effectLst>
+          <a:outerShdw blurRad="40000" dist="23000" dir="5400000" rotWithShape="0">
+            <a:srgbClr val="000000">
+              <a:alpha val="35000"/>
+            </a:srgbClr>
+          </a:outerShdw>
+        </a:effectLst>
+        <a:scene3d>
+          <a:camera prst="orthographicFront"/>
+          <a:lightRig rig="threePt" dir="t">
+            <a:rot lat="0" lon="0" rev="7500000"/>
+          </a:lightRig>
+        </a:scene3d>
+        <a:sp3d z="-70000" extrusionH="63500" prstMaterial="matte">
+          <a:bevelT w="25400" h="6350" prst="relaxedInset"/>
+          <a:contourClr>
+            <a:schemeClr val="bg1"/>
+          </a:contourClr>
+        </a:sp3d>
+      </dsp:spPr>
+      <dsp:style>
+        <a:lnRef idx="0">
+          <a:scrgbClr r="0" g="0" b="0"/>
+        </a:lnRef>
+        <a:fillRef idx="1">
+          <a:scrgbClr r="0" g="0" b="0"/>
+        </a:fillRef>
+        <a:effectRef idx="2">
+          <a:scrgbClr r="0" g="0" b="0"/>
+        </a:effectRef>
+        <a:fontRef idx="minor">
+          <a:schemeClr val="lt1"/>
+        </a:fontRef>
+      </dsp:style>
+      <dsp:txBody>
+        <a:bodyPr spcFirstLastPara="0" vert="horz" wrap="square" lIns="0" tIns="0" rIns="0" bIns="0" numCol="1" spcCol="1270" anchor="ctr" anchorCtr="0">
+          <a:noAutofit/>
+        </a:bodyPr>
+        <a:lstStyle/>
+        <a:p>
+          <a:pPr marL="0" lvl="0" indent="0" algn="ctr" defTabSz="1022350">
+            <a:lnSpc>
+              <a:spcPct val="90000"/>
+            </a:lnSpc>
+            <a:spcBef>
+              <a:spcPct val="0"/>
+            </a:spcBef>
+            <a:spcAft>
+              <a:spcPct val="35000"/>
+            </a:spcAft>
+            <a:buNone/>
+          </a:pPr>
+          <a:endParaRPr lang="pt-PT" sz="2300" kern="1200"/>
+        </a:p>
+      </dsp:txBody>
+      <dsp:txXfrm>
+        <a:off x="5493029" y="1140777"/>
+        <a:ext cx="325630" cy="326508"/>
+      </dsp:txXfrm>
+    </dsp:sp>
+    <dsp:sp modelId="{E2977B89-8593-45BD-9BA3-682EBE2257F4}">
+      <dsp:nvSpPr>
+        <dsp:cNvPr id="0" name=""/>
+        <dsp:cNvSpPr/>
+      </dsp:nvSpPr>
+      <dsp:spPr>
+        <a:xfrm>
+          <a:off x="6151311" y="645749"/>
+          <a:ext cx="2194275" cy="1316565"/>
         </a:xfrm>
         <a:prstGeom prst="roundRect">
-          <a:avLst/>
+          <a:avLst>
+            <a:gd name="adj" fmla="val 10000"/>
+          </a:avLst>
         </a:prstGeom>
         <a:gradFill rotWithShape="0">
           <a:gsLst>
@@ -1639,7 +1694,7 @@
         </a:bodyPr>
         <a:lstStyle/>
         <a:p>
-          <a:pPr lvl="0" algn="ctr" defTabSz="889000">
+          <a:pPr marL="0" lvl="0" indent="0" algn="ctr" defTabSz="889000">
             <a:lnSpc>
               <a:spcPct val="90000"/>
             </a:lnSpc>
@@ -1649,25 +1704,21 @@
             <a:spcAft>
               <a:spcPct val="35000"/>
             </a:spcAft>
+            <a:buNone/>
           </a:pPr>
           <a:r>
-            <a:rPr lang="pt-PT" sz="2000" b="1" kern="1200" dirty="0" smtClean="0">
+            <a:rPr lang="pt-PT" sz="2000" b="1" kern="1200" dirty="0">
               <a:latin typeface="Times New Roman" pitchFamily="18" charset="0"/>
               <a:ea typeface="NSimSun" pitchFamily="49" charset="-122"/>
               <a:cs typeface="Times New Roman" pitchFamily="18" charset="0"/>
             </a:rPr>
             <a:t>Novos Produtos</a:t>
           </a:r>
-          <a:endParaRPr lang="pt-PT" sz="2000" b="1" kern="1200" dirty="0">
-            <a:latin typeface="Times New Roman" pitchFamily="18" charset="0"/>
-            <a:ea typeface="NSimSun" pitchFamily="49" charset="-122"/>
-            <a:cs typeface="Times New Roman" pitchFamily="18" charset="0"/>
-          </a:endParaRPr>
         </a:p>
       </dsp:txBody>
       <dsp:txXfrm>
-        <a:off x="5847049" y="782419"/>
-        <a:ext cx="2505878" cy="1043225"/>
+        <a:off x="6189872" y="684310"/>
+        <a:ext cx="2117153" cy="1239443"/>
       </dsp:txXfrm>
     </dsp:sp>
   </dsp:spTree>
@@ -1675,12 +1726,12 @@
 </file>
 
 <file path=ppt/diagrams/layout1.xml><?xml version="1.0" encoding="utf-8"?>
-<dgm:layoutDef xmlns:dgm="http://schemas.openxmlformats.org/drawingml/2006/diagram" xmlns:a="http://schemas.openxmlformats.org/drawingml/2006/main" uniqueId="urn:microsoft.com/office/officeart/2005/8/layout/hProcess9">
+<dgm:layoutDef xmlns:dgm="http://schemas.openxmlformats.org/drawingml/2006/diagram" xmlns:a="http://schemas.openxmlformats.org/drawingml/2006/main" uniqueId="urn:microsoft.com/office/officeart/2005/8/layout/process1">
   <dgm:title val=""/>
   <dgm:desc val=""/>
   <dgm:catLst>
-    <dgm:cat type="process" pri="5000"/>
-    <dgm:cat type="convert" pri="13000"/>
+    <dgm:cat type="process" pri="1000"/>
+    <dgm:cat type="convert" pri="15000"/>
   </dgm:catLst>
   <dgm:sampData useDef="1">
     <dgm:dataModel>
@@ -1723,113 +1774,105 @@
       <dgm:whole/>
     </dgm:dataModel>
   </dgm:clrData>
-  <dgm:layoutNode name="CompostProcess">
+  <dgm:layoutNode name="Name0">
     <dgm:varLst>
       <dgm:dir/>
       <dgm:resizeHandles val="exact"/>
     </dgm:varLst>
-    <dgm:alg type="composite">
-      <dgm:param type="horzAlign" val="ctr"/>
-      <dgm:param type="vertAlign" val="mid"/>
-    </dgm:alg>
+    <dgm:choose name="Name1">
+      <dgm:if name="Name2" func="var" arg="dir" op="equ" val="norm">
+        <dgm:alg type="lin"/>
+      </dgm:if>
+      <dgm:else name="Name3">
+        <dgm:alg type="lin">
+          <dgm:param type="linDir" val="fromR"/>
+        </dgm:alg>
+      </dgm:else>
+    </dgm:choose>
     <dgm:shape xmlns:r="http://schemas.openxmlformats.org/officeDocument/2006/relationships" r:blip="">
       <dgm:adjLst/>
     </dgm:shape>
     <dgm:presOf/>
     <dgm:constrLst>
-      <dgm:constr type="w" for="ch" forName="arrow" refType="w" fact="0.85"/>
-      <dgm:constr type="h" for="ch" forName="arrow" refType="h"/>
-      <dgm:constr type="ctrX" for="ch" forName="arrow" refType="w" fact="0.5"/>
-      <dgm:constr type="ctrY" for="ch" forName="arrow" refType="h" fact="0.5"/>
-      <dgm:constr type="w" for="ch" forName="linearProcess" refType="w"/>
-      <dgm:constr type="h" for="ch" forName="linearProcess" refType="h" fact="0.4"/>
-      <dgm:constr type="ctrX" for="ch" forName="linearProcess" refType="w" fact="0.5"/>
-      <dgm:constr type="ctrY" for="ch" forName="linearProcess" refType="h" fact="0.5"/>
+      <dgm:constr type="w" for="ch" ptType="node" refType="w"/>
+      <dgm:constr type="h" for="ch" ptType="node" op="equ"/>
+      <dgm:constr type="primFontSz" for="ch" ptType="node" op="equ" val="65"/>
+      <dgm:constr type="w" for="ch" ptType="sibTrans" refType="w" refFor="ch" refPtType="node" op="equ" fact="0.4"/>
+      <dgm:constr type="h" for="ch" ptType="sibTrans" op="equ"/>
+      <dgm:constr type="primFontSz" for="des" forName="connectorText" op="equ" val="55"/>
+      <dgm:constr type="primFontSz" for="des" forName="connectorText" refType="primFontSz" refFor="ch" refPtType="node" op="lte" fact="0.8"/>
     </dgm:constrLst>
     <dgm:ruleLst/>
-    <dgm:layoutNode name="arrow" styleLbl="bgShp">
-      <dgm:alg type="sp"/>
-      <dgm:choose name="Name0">
-        <dgm:if name="Name1" func="var" arg="dir" op="equ" val="norm">
-          <dgm:shape xmlns:r="http://schemas.openxmlformats.org/officeDocument/2006/relationships" type="rightArrow" r:blip="">
+    <dgm:forEach name="nodesForEach" axis="ch" ptType="node">
+      <dgm:layoutNode name="node">
+        <dgm:varLst>
+          <dgm:bulletEnabled val="1"/>
+        </dgm:varLst>
+        <dgm:alg type="tx"/>
+        <dgm:shape xmlns:r="http://schemas.openxmlformats.org/officeDocument/2006/relationships" type="roundRect" r:blip="">
+          <dgm:adjLst>
+            <dgm:adj idx="1" val="0.1"/>
+          </dgm:adjLst>
+        </dgm:shape>
+        <dgm:presOf axis="desOrSelf" ptType="node"/>
+        <dgm:constrLst>
+          <dgm:constr type="h" refType="w" fact="0.6"/>
+          <dgm:constr type="tMarg" refType="primFontSz" fact="0.3"/>
+          <dgm:constr type="bMarg" refType="primFontSz" fact="0.3"/>
+          <dgm:constr type="lMarg" refType="primFontSz" fact="0.3"/>
+          <dgm:constr type="rMarg" refType="primFontSz" fact="0.3"/>
+        </dgm:constrLst>
+        <dgm:ruleLst>
+          <dgm:rule type="primFontSz" val="18" fact="NaN" max="NaN"/>
+          <dgm:rule type="h" val="NaN" fact="1.5" max="NaN"/>
+          <dgm:rule type="primFontSz" val="5" fact="NaN" max="NaN"/>
+          <dgm:rule type="h" val="INF" fact="NaN" max="NaN"/>
+        </dgm:ruleLst>
+      </dgm:layoutNode>
+      <dgm:forEach name="sibTransForEach" axis="followSib" ptType="sibTrans" cnt="1">
+        <dgm:layoutNode name="sibTrans">
+          <dgm:alg type="conn">
+            <dgm:param type="begPts" val="auto"/>
+            <dgm:param type="endPts" val="auto"/>
+          </dgm:alg>
+          <dgm:shape xmlns:r="http://schemas.openxmlformats.org/officeDocument/2006/relationships" type="conn" r:blip="">
             <dgm:adjLst/>
           </dgm:shape>
-        </dgm:if>
-        <dgm:else name="Name2">
-          <dgm:shape xmlns:r="http://schemas.openxmlformats.org/officeDocument/2006/relationships" type="leftArrow" r:blip="">
-            <dgm:adjLst/>
-          </dgm:shape>
-        </dgm:else>
-      </dgm:choose>
-      <dgm:presOf/>
-      <dgm:constrLst/>
-      <dgm:ruleLst/>
-    </dgm:layoutNode>
-    <dgm:layoutNode name="linearProcess">
-      <dgm:choose name="Name3">
-        <dgm:if name="Name4" func="var" arg="dir" op="equ" val="norm">
-          <dgm:alg type="lin"/>
-        </dgm:if>
-        <dgm:else name="Name5">
-          <dgm:alg type="lin">
-            <dgm:param type="linDir" val="fromR"/>
-          </dgm:alg>
-        </dgm:else>
-      </dgm:choose>
-      <dgm:shape xmlns:r="http://schemas.openxmlformats.org/officeDocument/2006/relationships" r:blip="">
-        <dgm:adjLst/>
-      </dgm:shape>
-      <dgm:presOf/>
-      <dgm:constrLst>
-        <dgm:constr type="userA" for="ch" ptType="node" refType="w"/>
-        <dgm:constr type="h" for="ch" ptType="node" refType="h"/>
-        <dgm:constr type="w" for="ch" ptType="node" op="equ"/>
-        <dgm:constr type="w" for="ch" forName="sibTrans" refType="w" fact="0.05"/>
-        <dgm:constr type="primFontSz" for="ch" ptType="node" op="equ" val="65"/>
-      </dgm:constrLst>
-      <dgm:ruleLst/>
-      <dgm:forEach name="Name6" axis="ch" ptType="node">
-        <dgm:layoutNode name="textNode" styleLbl="node1">
-          <dgm:varLst>
-            <dgm:bulletEnabled val="1"/>
-          </dgm:varLst>
-          <dgm:alg type="tx"/>
-          <dgm:shape xmlns:r="http://schemas.openxmlformats.org/officeDocument/2006/relationships" type="roundRect" r:blip="">
-            <dgm:adjLst/>
-          </dgm:shape>
-          <dgm:presOf axis="desOrSelf" ptType="node"/>
+          <dgm:presOf axis="self"/>
           <dgm:constrLst>
-            <dgm:constr type="userA"/>
-            <dgm:constr type="w" refType="userA" fact="0.3"/>
-            <dgm:constr type="tMarg" refType="primFontSz" fact="0.3"/>
-            <dgm:constr type="bMarg" refType="primFontSz" fact="0.3"/>
-            <dgm:constr type="lMarg" refType="primFontSz" fact="0.3"/>
-            <dgm:constr type="rMarg" refType="primFontSz" fact="0.3"/>
+            <dgm:constr type="h" refType="w" fact="0.62"/>
+            <dgm:constr type="connDist"/>
+            <dgm:constr type="begPad" refType="connDist" fact="0.25"/>
+            <dgm:constr type="endPad" refType="connDist" fact="0.22"/>
           </dgm:constrLst>
-          <dgm:ruleLst>
-            <dgm:rule type="w" val="NaN" fact="1" max="NaN"/>
-            <dgm:rule type="primFontSz" val="5" fact="NaN" max="NaN"/>
-          </dgm:ruleLst>
-        </dgm:layoutNode>
-        <dgm:forEach name="Name7" axis="followSib" ptType="sibTrans" cnt="1">
-          <dgm:layoutNode name="sibTrans">
-            <dgm:alg type="sp"/>
-            <dgm:shape xmlns:r="http://schemas.openxmlformats.org/officeDocument/2006/relationships" r:blip="">
+          <dgm:ruleLst/>
+          <dgm:layoutNode name="connectorText">
+            <dgm:alg type="tx">
+              <dgm:param type="autoTxRot" val="grav"/>
+            </dgm:alg>
+            <dgm:shape xmlns:r="http://schemas.openxmlformats.org/officeDocument/2006/relationships" type="conn" r:blip="" hideGeom="1">
               <dgm:adjLst/>
             </dgm:shape>
-            <dgm:presOf/>
-            <dgm:constrLst/>
-            <dgm:ruleLst/>
+            <dgm:presOf axis="self"/>
+            <dgm:constrLst>
+              <dgm:constr type="lMarg"/>
+              <dgm:constr type="rMarg"/>
+              <dgm:constr type="tMarg"/>
+              <dgm:constr type="bMarg"/>
+            </dgm:constrLst>
+            <dgm:ruleLst>
+              <dgm:rule type="primFontSz" val="5" fact="NaN" max="NaN"/>
+            </dgm:ruleLst>
           </dgm:layoutNode>
-        </dgm:forEach>
+        </dgm:layoutNode>
       </dgm:forEach>
-    </dgm:layoutNode>
+    </dgm:forEach>
   </dgm:layoutNode>
 </dgm:layoutDef>
 </file>
 
 <file path=ppt/diagrams/quickStyle1.xml><?xml version="1.0" encoding="utf-8"?>
-<dgm:styleDef xmlns:dgm="http://schemas.openxmlformats.org/drawingml/2006/diagram" xmlns:a="http://schemas.openxmlformats.org/drawingml/2006/main" uniqueId="urn:microsoft.com/office/officeart/2005/8/quickstyle/3d2">
+<dgm:styleDef xmlns:dgm="http://schemas.openxmlformats.org/drawingml/2006/diagram" xmlns:a="http://schemas.openxmlformats.org/drawingml/2006/main" uniqueId="urn:microsoft.com/office/officeart/2005/8/quickstyle/3d2#1">
   <dgm:title val=""/>
   <dgm:desc val=""/>
   <dgm:catLst>
@@ -3173,7 +3216,7 @@
             <a:fld id="{1232A39F-8883-4502-AA85-AF55FB4D338A}" type="datetimeFigureOut">
               <a:rPr lang="pt-PT" smtClean="0"/>
               <a:pPr/>
-              <a:t>27-09-2017</a:t>
+              <a:t>28/09/2017</a:t>
             </a:fld>
             <a:endParaRPr lang="pt-PT"/>
           </a:p>
@@ -3239,38 +3282,37 @@
           <a:p>
             <a:pPr lvl="0"/>
             <a:r>
-              <a:rPr lang="pt-PT" smtClean="0"/>
+              <a:rPr lang="pt-PT"/>
               <a:t>Clique para editar os estilos</a:t>
             </a:r>
           </a:p>
           <a:p>
             <a:pPr lvl="1"/>
             <a:r>
-              <a:rPr lang="pt-PT" smtClean="0"/>
+              <a:rPr lang="pt-PT"/>
               <a:t>Segundo nível</a:t>
             </a:r>
           </a:p>
           <a:p>
             <a:pPr lvl="2"/>
             <a:r>
-              <a:rPr lang="pt-PT" smtClean="0"/>
+              <a:rPr lang="pt-PT"/>
               <a:t>Terceiro nível</a:t>
             </a:r>
           </a:p>
           <a:p>
             <a:pPr lvl="3"/>
             <a:r>
-              <a:rPr lang="pt-PT" smtClean="0"/>
+              <a:rPr lang="pt-PT"/>
               <a:t>Quarto nível</a:t>
             </a:r>
           </a:p>
           <a:p>
             <a:pPr lvl="4"/>
             <a:r>
-              <a:rPr lang="pt-PT" smtClean="0"/>
+              <a:rPr lang="pt-PT"/>
               <a:t>Quinto nível</a:t>
             </a:r>
-            <a:endParaRPr lang="pt-PT"/>
           </a:p>
         </p:txBody>
       </p:sp>
@@ -3507,7 +3549,7 @@
             <a:fld id="{4158C1B7-E1BB-40FE-BD96-0D8FA0785D38}" type="slidenum">
               <a:rPr lang="pt-PT" smtClean="0"/>
               <a:pPr/>
-              <a:t>5</a:t>
+              <a:t>11</a:t>
             </a:fld>
             <a:endParaRPr lang="pt-PT"/>
           </a:p>
@@ -3559,10 +3601,9 @@
           <a:lstStyle/>
           <a:p>
             <a:r>
-              <a:rPr lang="pt-PT" smtClean="0"/>
+              <a:rPr lang="pt-PT"/>
               <a:t>Clique para editar o estilo</a:t>
             </a:r>
-            <a:endParaRPr lang="pt-PT"/>
           </a:p>
         </p:txBody>
       </p:sp>
@@ -3678,10 +3719,9 @@
           </a:lstStyle>
           <a:p>
             <a:r>
-              <a:rPr lang="pt-PT" smtClean="0"/>
+              <a:rPr lang="pt-PT"/>
               <a:t>Faça clique para editar o estilo</a:t>
             </a:r>
-            <a:endParaRPr lang="pt-PT"/>
           </a:p>
         </p:txBody>
       </p:sp>
@@ -3703,7 +3743,7 @@
             <a:fld id="{79445B04-9311-446B-9E4D-E503D6F5AB66}" type="datetimeFigureOut">
               <a:rPr lang="pt-PT" smtClean="0"/>
               <a:pPr/>
-              <a:t>27-09-2017</a:t>
+              <a:t>28/09/2017</a:t>
             </a:fld>
             <a:endParaRPr lang="pt-PT"/>
           </a:p>
@@ -3793,10 +3833,9 @@
           <a:lstStyle/>
           <a:p>
             <a:r>
-              <a:rPr lang="pt-PT" smtClean="0"/>
+              <a:rPr lang="pt-PT"/>
               <a:t>Clique para editar o estilo</a:t>
             </a:r>
-            <a:endParaRPr lang="pt-PT"/>
           </a:p>
         </p:txBody>
       </p:sp>
@@ -3817,38 +3856,37 @@
           <a:p>
             <a:pPr lvl="0"/>
             <a:r>
-              <a:rPr lang="pt-PT" smtClean="0"/>
+              <a:rPr lang="pt-PT"/>
               <a:t>Clique para editar os estilos</a:t>
             </a:r>
           </a:p>
           <a:p>
             <a:pPr lvl="1"/>
             <a:r>
-              <a:rPr lang="pt-PT" smtClean="0"/>
+              <a:rPr lang="pt-PT"/>
               <a:t>Segundo nível</a:t>
             </a:r>
           </a:p>
           <a:p>
             <a:pPr lvl="2"/>
             <a:r>
-              <a:rPr lang="pt-PT" smtClean="0"/>
+              <a:rPr lang="pt-PT"/>
               <a:t>Terceiro nível</a:t>
             </a:r>
           </a:p>
           <a:p>
             <a:pPr lvl="3"/>
             <a:r>
-              <a:rPr lang="pt-PT" smtClean="0"/>
+              <a:rPr lang="pt-PT"/>
               <a:t>Quarto nível</a:t>
             </a:r>
           </a:p>
           <a:p>
             <a:pPr lvl="4"/>
             <a:r>
-              <a:rPr lang="pt-PT" smtClean="0"/>
+              <a:rPr lang="pt-PT"/>
               <a:t>Quinto nível</a:t>
             </a:r>
-            <a:endParaRPr lang="pt-PT"/>
           </a:p>
         </p:txBody>
       </p:sp>
@@ -3870,7 +3908,7 @@
             <a:fld id="{79445B04-9311-446B-9E4D-E503D6F5AB66}" type="datetimeFigureOut">
               <a:rPr lang="pt-PT" smtClean="0"/>
               <a:pPr/>
-              <a:t>27-09-2017</a:t>
+              <a:t>28/09/2017</a:t>
             </a:fld>
             <a:endParaRPr lang="pt-PT"/>
           </a:p>
@@ -3965,10 +4003,9 @@
           <a:lstStyle/>
           <a:p>
             <a:r>
-              <a:rPr lang="pt-PT" smtClean="0"/>
+              <a:rPr lang="pt-PT"/>
               <a:t>Clique para editar o estilo</a:t>
             </a:r>
-            <a:endParaRPr lang="pt-PT"/>
           </a:p>
         </p:txBody>
       </p:sp>
@@ -3994,38 +4031,37 @@
           <a:p>
             <a:pPr lvl="0"/>
             <a:r>
-              <a:rPr lang="pt-PT" smtClean="0"/>
+              <a:rPr lang="pt-PT"/>
               <a:t>Clique para editar os estilos</a:t>
             </a:r>
           </a:p>
           <a:p>
             <a:pPr lvl="1"/>
             <a:r>
-              <a:rPr lang="pt-PT" smtClean="0"/>
+              <a:rPr lang="pt-PT"/>
               <a:t>Segundo nível</a:t>
             </a:r>
           </a:p>
           <a:p>
             <a:pPr lvl="2"/>
             <a:r>
-              <a:rPr lang="pt-PT" smtClean="0"/>
+              <a:rPr lang="pt-PT"/>
               <a:t>Terceiro nível</a:t>
             </a:r>
           </a:p>
           <a:p>
             <a:pPr lvl="3"/>
             <a:r>
-              <a:rPr lang="pt-PT" smtClean="0"/>
+              <a:rPr lang="pt-PT"/>
               <a:t>Quarto nível</a:t>
             </a:r>
           </a:p>
           <a:p>
             <a:pPr lvl="4"/>
             <a:r>
-              <a:rPr lang="pt-PT" smtClean="0"/>
+              <a:rPr lang="pt-PT"/>
               <a:t>Quinto nível</a:t>
             </a:r>
-            <a:endParaRPr lang="pt-PT"/>
           </a:p>
         </p:txBody>
       </p:sp>
@@ -4047,7 +4083,7 @@
             <a:fld id="{79445B04-9311-446B-9E4D-E503D6F5AB66}" type="datetimeFigureOut">
               <a:rPr lang="pt-PT" smtClean="0"/>
               <a:pPr/>
-              <a:t>27-09-2017</a:t>
+              <a:t>28/09/2017</a:t>
             </a:fld>
             <a:endParaRPr lang="pt-PT"/>
           </a:p>
@@ -4137,10 +4173,9 @@
           <a:lstStyle/>
           <a:p>
             <a:r>
-              <a:rPr lang="pt-PT" smtClean="0"/>
+              <a:rPr lang="pt-PT"/>
               <a:t>Clique para editar o estilo</a:t>
             </a:r>
-            <a:endParaRPr lang="pt-PT"/>
           </a:p>
         </p:txBody>
       </p:sp>
@@ -4161,38 +4196,37 @@
           <a:p>
             <a:pPr lvl="0"/>
             <a:r>
-              <a:rPr lang="pt-PT" smtClean="0"/>
+              <a:rPr lang="pt-PT"/>
               <a:t>Clique para editar os estilos</a:t>
             </a:r>
           </a:p>
           <a:p>
             <a:pPr lvl="1"/>
             <a:r>
-              <a:rPr lang="pt-PT" smtClean="0"/>
+              <a:rPr lang="pt-PT"/>
               <a:t>Segundo nível</a:t>
             </a:r>
           </a:p>
           <a:p>
             <a:pPr lvl="2"/>
             <a:r>
-              <a:rPr lang="pt-PT" smtClean="0"/>
+              <a:rPr lang="pt-PT"/>
               <a:t>Terceiro nível</a:t>
             </a:r>
           </a:p>
           <a:p>
             <a:pPr lvl="3"/>
             <a:r>
-              <a:rPr lang="pt-PT" smtClean="0"/>
+              <a:rPr lang="pt-PT"/>
               <a:t>Quarto nível</a:t>
             </a:r>
           </a:p>
           <a:p>
             <a:pPr lvl="4"/>
             <a:r>
-              <a:rPr lang="pt-PT" smtClean="0"/>
+              <a:rPr lang="pt-PT"/>
               <a:t>Quinto nível</a:t>
             </a:r>
-            <a:endParaRPr lang="pt-PT"/>
           </a:p>
         </p:txBody>
       </p:sp>
@@ -4214,7 +4248,7 @@
             <a:fld id="{79445B04-9311-446B-9E4D-E503D6F5AB66}" type="datetimeFigureOut">
               <a:rPr lang="pt-PT" smtClean="0"/>
               <a:pPr/>
-              <a:t>27-09-2017</a:t>
+              <a:t>28/09/2017</a:t>
             </a:fld>
             <a:endParaRPr lang="pt-PT"/>
           </a:p>
@@ -4313,10 +4347,9 @@
           </a:lstStyle>
           <a:p>
             <a:r>
-              <a:rPr lang="pt-PT" smtClean="0"/>
+              <a:rPr lang="pt-PT"/>
               <a:t>Clique para editar o estilo</a:t>
             </a:r>
-            <a:endParaRPr lang="pt-PT"/>
           </a:p>
         </p:txBody>
       </p:sp>
@@ -4433,7 +4466,7 @@
           <a:p>
             <a:pPr lvl="0"/>
             <a:r>
-              <a:rPr lang="pt-PT" smtClean="0"/>
+              <a:rPr lang="pt-PT"/>
               <a:t>Clique para editar os estilos</a:t>
             </a:r>
           </a:p>
@@ -4457,7 +4490,7 @@
             <a:fld id="{79445B04-9311-446B-9E4D-E503D6F5AB66}" type="datetimeFigureOut">
               <a:rPr lang="pt-PT" smtClean="0"/>
               <a:pPr/>
-              <a:t>27-09-2017</a:t>
+              <a:t>28/09/2017</a:t>
             </a:fld>
             <a:endParaRPr lang="pt-PT"/>
           </a:p>
@@ -4547,10 +4580,9 @@
           <a:lstStyle/>
           <a:p>
             <a:r>
-              <a:rPr lang="pt-PT" smtClean="0"/>
+              <a:rPr lang="pt-PT"/>
               <a:t>Clique para editar o estilo</a:t>
             </a:r>
-            <a:endParaRPr lang="pt-PT"/>
           </a:p>
         </p:txBody>
       </p:sp>
@@ -4604,38 +4636,37 @@
           <a:p>
             <a:pPr lvl="0"/>
             <a:r>
-              <a:rPr lang="pt-PT" smtClean="0"/>
+              <a:rPr lang="pt-PT"/>
               <a:t>Clique para editar os estilos</a:t>
             </a:r>
           </a:p>
           <a:p>
             <a:pPr lvl="1"/>
             <a:r>
-              <a:rPr lang="pt-PT" smtClean="0"/>
+              <a:rPr lang="pt-PT"/>
               <a:t>Segundo nível</a:t>
             </a:r>
           </a:p>
           <a:p>
             <a:pPr lvl="2"/>
             <a:r>
-              <a:rPr lang="pt-PT" smtClean="0"/>
+              <a:rPr lang="pt-PT"/>
               <a:t>Terceiro nível</a:t>
             </a:r>
           </a:p>
           <a:p>
             <a:pPr lvl="3"/>
             <a:r>
-              <a:rPr lang="pt-PT" smtClean="0"/>
+              <a:rPr lang="pt-PT"/>
               <a:t>Quarto nível</a:t>
             </a:r>
           </a:p>
           <a:p>
             <a:pPr lvl="4"/>
             <a:r>
-              <a:rPr lang="pt-PT" smtClean="0"/>
+              <a:rPr lang="pt-PT"/>
               <a:t>Quinto nível</a:t>
             </a:r>
-            <a:endParaRPr lang="pt-PT"/>
           </a:p>
         </p:txBody>
       </p:sp>
@@ -4689,38 +4720,37 @@
           <a:p>
             <a:pPr lvl="0"/>
             <a:r>
-              <a:rPr lang="pt-PT" smtClean="0"/>
+              <a:rPr lang="pt-PT"/>
               <a:t>Clique para editar os estilos</a:t>
             </a:r>
           </a:p>
           <a:p>
             <a:pPr lvl="1"/>
             <a:r>
-              <a:rPr lang="pt-PT" smtClean="0"/>
+              <a:rPr lang="pt-PT"/>
               <a:t>Segundo nível</a:t>
             </a:r>
           </a:p>
           <a:p>
             <a:pPr lvl="2"/>
             <a:r>
-              <a:rPr lang="pt-PT" smtClean="0"/>
+              <a:rPr lang="pt-PT"/>
               <a:t>Terceiro nível</a:t>
             </a:r>
           </a:p>
           <a:p>
             <a:pPr lvl="3"/>
             <a:r>
-              <a:rPr lang="pt-PT" smtClean="0"/>
+              <a:rPr lang="pt-PT"/>
               <a:t>Quarto nível</a:t>
             </a:r>
           </a:p>
           <a:p>
             <a:pPr lvl="4"/>
             <a:r>
-              <a:rPr lang="pt-PT" smtClean="0"/>
+              <a:rPr lang="pt-PT"/>
               <a:t>Quinto nível</a:t>
             </a:r>
-            <a:endParaRPr lang="pt-PT"/>
           </a:p>
         </p:txBody>
       </p:sp>
@@ -4742,7 +4772,7 @@
             <a:fld id="{79445B04-9311-446B-9E4D-E503D6F5AB66}" type="datetimeFigureOut">
               <a:rPr lang="pt-PT" smtClean="0"/>
               <a:pPr/>
-              <a:t>27-09-2017</a:t>
+              <a:t>28/09/2017</a:t>
             </a:fld>
             <a:endParaRPr lang="pt-PT"/>
           </a:p>
@@ -4836,10 +4866,9 @@
           </a:lstStyle>
           <a:p>
             <a:r>
-              <a:rPr lang="pt-PT" smtClean="0"/>
+              <a:rPr lang="pt-PT"/>
               <a:t>Clique para editar o estilo</a:t>
             </a:r>
-            <a:endParaRPr lang="pt-PT"/>
           </a:p>
         </p:txBody>
       </p:sp>
@@ -4902,7 +4931,7 @@
           <a:p>
             <a:pPr lvl="0"/>
             <a:r>
-              <a:rPr lang="pt-PT" smtClean="0"/>
+              <a:rPr lang="pt-PT"/>
               <a:t>Clique para editar os estilos</a:t>
             </a:r>
           </a:p>
@@ -4958,38 +4987,37 @@
           <a:p>
             <a:pPr lvl="0"/>
             <a:r>
-              <a:rPr lang="pt-PT" smtClean="0"/>
+              <a:rPr lang="pt-PT"/>
               <a:t>Clique para editar os estilos</a:t>
             </a:r>
           </a:p>
           <a:p>
             <a:pPr lvl="1"/>
             <a:r>
-              <a:rPr lang="pt-PT" smtClean="0"/>
+              <a:rPr lang="pt-PT"/>
               <a:t>Segundo nível</a:t>
             </a:r>
           </a:p>
           <a:p>
             <a:pPr lvl="2"/>
             <a:r>
-              <a:rPr lang="pt-PT" smtClean="0"/>
+              <a:rPr lang="pt-PT"/>
               <a:t>Terceiro nível</a:t>
             </a:r>
           </a:p>
           <a:p>
             <a:pPr lvl="3"/>
             <a:r>
-              <a:rPr lang="pt-PT" smtClean="0"/>
+              <a:rPr lang="pt-PT"/>
               <a:t>Quarto nível</a:t>
             </a:r>
           </a:p>
           <a:p>
             <a:pPr lvl="4"/>
             <a:r>
-              <a:rPr lang="pt-PT" smtClean="0"/>
+              <a:rPr lang="pt-PT"/>
               <a:t>Quinto nível</a:t>
             </a:r>
-            <a:endParaRPr lang="pt-PT"/>
           </a:p>
         </p:txBody>
       </p:sp>
@@ -5052,7 +5080,7 @@
           <a:p>
             <a:pPr lvl="0"/>
             <a:r>
-              <a:rPr lang="pt-PT" smtClean="0"/>
+              <a:rPr lang="pt-PT"/>
               <a:t>Clique para editar os estilos</a:t>
             </a:r>
           </a:p>
@@ -5108,38 +5136,37 @@
           <a:p>
             <a:pPr lvl="0"/>
             <a:r>
-              <a:rPr lang="pt-PT" smtClean="0"/>
+              <a:rPr lang="pt-PT"/>
               <a:t>Clique para editar os estilos</a:t>
             </a:r>
           </a:p>
           <a:p>
             <a:pPr lvl="1"/>
             <a:r>
-              <a:rPr lang="pt-PT" smtClean="0"/>
+              <a:rPr lang="pt-PT"/>
               <a:t>Segundo nível</a:t>
             </a:r>
           </a:p>
           <a:p>
             <a:pPr lvl="2"/>
             <a:r>
-              <a:rPr lang="pt-PT" smtClean="0"/>
+              <a:rPr lang="pt-PT"/>
               <a:t>Terceiro nível</a:t>
             </a:r>
           </a:p>
           <a:p>
             <a:pPr lvl="3"/>
             <a:r>
-              <a:rPr lang="pt-PT" smtClean="0"/>
+              <a:rPr lang="pt-PT"/>
               <a:t>Quarto nível</a:t>
             </a:r>
           </a:p>
           <a:p>
             <a:pPr lvl="4"/>
             <a:r>
-              <a:rPr lang="pt-PT" smtClean="0"/>
+              <a:rPr lang="pt-PT"/>
               <a:t>Quinto nível</a:t>
             </a:r>
-            <a:endParaRPr lang="pt-PT"/>
           </a:p>
         </p:txBody>
       </p:sp>
@@ -5161,7 +5188,7 @@
             <a:fld id="{79445B04-9311-446B-9E4D-E503D6F5AB66}" type="datetimeFigureOut">
               <a:rPr lang="pt-PT" smtClean="0"/>
               <a:pPr/>
-              <a:t>27-09-2017</a:t>
+              <a:t>28/09/2017</a:t>
             </a:fld>
             <a:endParaRPr lang="pt-PT"/>
           </a:p>
@@ -5251,10 +5278,9 @@
           <a:lstStyle/>
           <a:p>
             <a:r>
-              <a:rPr lang="pt-PT" smtClean="0"/>
+              <a:rPr lang="pt-PT"/>
               <a:t>Clique para editar o estilo</a:t>
             </a:r>
-            <a:endParaRPr lang="pt-PT"/>
           </a:p>
         </p:txBody>
       </p:sp>
@@ -5276,7 +5302,7 @@
             <a:fld id="{79445B04-9311-446B-9E4D-E503D6F5AB66}" type="datetimeFigureOut">
               <a:rPr lang="pt-PT" smtClean="0"/>
               <a:pPr/>
-              <a:t>27-09-2017</a:t>
+              <a:t>28/09/2017</a:t>
             </a:fld>
             <a:endParaRPr lang="pt-PT"/>
           </a:p>
@@ -5368,7 +5394,7 @@
             <a:fld id="{79445B04-9311-446B-9E4D-E503D6F5AB66}" type="datetimeFigureOut">
               <a:rPr lang="pt-PT" smtClean="0"/>
               <a:pPr/>
-              <a:t>27-09-2017</a:t>
+              <a:t>28/09/2017</a:t>
             </a:fld>
             <a:endParaRPr lang="pt-PT"/>
           </a:p>
@@ -5467,10 +5493,9 @@
           </a:lstStyle>
           <a:p>
             <a:r>
-              <a:rPr lang="pt-PT" smtClean="0"/>
+              <a:rPr lang="pt-PT"/>
               <a:t>Clique para editar o estilo</a:t>
             </a:r>
-            <a:endParaRPr lang="pt-PT"/>
           </a:p>
         </p:txBody>
       </p:sp>
@@ -5524,38 +5549,37 @@
           <a:p>
             <a:pPr lvl="0"/>
             <a:r>
-              <a:rPr lang="pt-PT" smtClean="0"/>
+              <a:rPr lang="pt-PT"/>
               <a:t>Clique para editar os estilos</a:t>
             </a:r>
           </a:p>
           <a:p>
             <a:pPr lvl="1"/>
             <a:r>
-              <a:rPr lang="pt-PT" smtClean="0"/>
+              <a:rPr lang="pt-PT"/>
               <a:t>Segundo nível</a:t>
             </a:r>
           </a:p>
           <a:p>
             <a:pPr lvl="2"/>
             <a:r>
-              <a:rPr lang="pt-PT" smtClean="0"/>
+              <a:rPr lang="pt-PT"/>
               <a:t>Terceiro nível</a:t>
             </a:r>
           </a:p>
           <a:p>
             <a:pPr lvl="3"/>
             <a:r>
-              <a:rPr lang="pt-PT" smtClean="0"/>
+              <a:rPr lang="pt-PT"/>
               <a:t>Quarto nível</a:t>
             </a:r>
           </a:p>
           <a:p>
             <a:pPr lvl="4"/>
             <a:r>
-              <a:rPr lang="pt-PT" smtClean="0"/>
+              <a:rPr lang="pt-PT"/>
               <a:t>Quinto nível</a:t>
             </a:r>
-            <a:endParaRPr lang="pt-PT"/>
           </a:p>
         </p:txBody>
       </p:sp>
@@ -5618,7 +5642,7 @@
           <a:p>
             <a:pPr lvl="0"/>
             <a:r>
-              <a:rPr lang="pt-PT" smtClean="0"/>
+              <a:rPr lang="pt-PT"/>
               <a:t>Clique para editar os estilos</a:t>
             </a:r>
           </a:p>
@@ -5642,7 +5666,7 @@
             <a:fld id="{79445B04-9311-446B-9E4D-E503D6F5AB66}" type="datetimeFigureOut">
               <a:rPr lang="pt-PT" smtClean="0"/>
               <a:pPr/>
-              <a:t>27-09-2017</a:t>
+              <a:t>28/09/2017</a:t>
             </a:fld>
             <a:endParaRPr lang="pt-PT"/>
           </a:p>
@@ -5741,10 +5765,9 @@
           </a:lstStyle>
           <a:p>
             <a:r>
-              <a:rPr lang="pt-PT" smtClean="0"/>
+              <a:rPr lang="pt-PT"/>
               <a:t>Clique para editar o estilo</a:t>
             </a:r>
-            <a:endParaRPr lang="pt-PT"/>
           </a:p>
         </p:txBody>
       </p:sp>
@@ -5868,7 +5891,7 @@
           <a:p>
             <a:pPr lvl="0"/>
             <a:r>
-              <a:rPr lang="pt-PT" smtClean="0"/>
+              <a:rPr lang="pt-PT"/>
               <a:t>Clique para editar os estilos</a:t>
             </a:r>
           </a:p>
@@ -5892,7 +5915,7 @@
             <a:fld id="{79445B04-9311-446B-9E4D-E503D6F5AB66}" type="datetimeFigureOut">
               <a:rPr lang="pt-PT" smtClean="0"/>
               <a:pPr/>
-              <a:t>27-09-2017</a:t>
+              <a:t>28/09/2017</a:t>
             </a:fld>
             <a:endParaRPr lang="pt-PT"/>
           </a:p>
@@ -5997,10 +6020,9 @@
           <a:lstStyle/>
           <a:p>
             <a:r>
-              <a:rPr lang="pt-PT" smtClean="0"/>
+              <a:rPr lang="pt-PT"/>
               <a:t>Clique para editar o estilo</a:t>
             </a:r>
-            <a:endParaRPr lang="pt-PT"/>
           </a:p>
         </p:txBody>
       </p:sp>
@@ -6031,38 +6053,37 @@
           <a:p>
             <a:pPr lvl="0"/>
             <a:r>
-              <a:rPr lang="pt-PT" smtClean="0"/>
+              <a:rPr lang="pt-PT"/>
               <a:t>Clique para editar os estilos</a:t>
             </a:r>
           </a:p>
           <a:p>
             <a:pPr lvl="1"/>
             <a:r>
-              <a:rPr lang="pt-PT" smtClean="0"/>
+              <a:rPr lang="pt-PT"/>
               <a:t>Segundo nível</a:t>
             </a:r>
           </a:p>
           <a:p>
             <a:pPr lvl="2"/>
             <a:r>
-              <a:rPr lang="pt-PT" smtClean="0"/>
+              <a:rPr lang="pt-PT"/>
               <a:t>Terceiro nível</a:t>
             </a:r>
           </a:p>
           <a:p>
             <a:pPr lvl="3"/>
             <a:r>
-              <a:rPr lang="pt-PT" smtClean="0"/>
+              <a:rPr lang="pt-PT"/>
               <a:t>Quarto nível</a:t>
             </a:r>
           </a:p>
           <a:p>
             <a:pPr lvl="4"/>
             <a:r>
-              <a:rPr lang="pt-PT" smtClean="0"/>
+              <a:rPr lang="pt-PT"/>
               <a:t>Quinto nível</a:t>
             </a:r>
-            <a:endParaRPr lang="pt-PT"/>
           </a:p>
         </p:txBody>
       </p:sp>
@@ -6102,7 +6123,7 @@
             <a:fld id="{79445B04-9311-446B-9E4D-E503D6F5AB66}" type="datetimeFigureOut">
               <a:rPr lang="pt-PT" smtClean="0"/>
               <a:pPr/>
-              <a:t>27-09-2017</a:t>
+              <a:t>28/09/2017</a:t>
             </a:fld>
             <a:endParaRPr lang="pt-PT"/>
           </a:p>
@@ -6489,8 +6510,8 @@
         </p:blipFill>
         <p:spPr>
           <a:xfrm>
-            <a:off x="5334000" y="3429000"/>
-            <a:ext cx="3810000" cy="3429000"/>
+            <a:off x="5220072" y="3356992"/>
+            <a:ext cx="3923928" cy="3429000"/>
           </a:xfrm>
           <a:prstGeom prst="rect">
             <a:avLst/>
@@ -6515,16 +6536,79 @@
           <a:lstStyle/>
           <a:p>
             <a:r>
-              <a:rPr lang="pt-PT" dirty="0" smtClean="0">
+              <a:rPr lang="pt-PT" dirty="0">
                 <a:latin typeface="NSimSun" pitchFamily="49" charset="-122"/>
                 <a:ea typeface="NSimSun" pitchFamily="49" charset="-122"/>
               </a:rPr>
-              <a:t>5 Principais Industrias Transformadoras do Porto</a:t>
-            </a:r>
-            <a:endParaRPr lang="pt-PT" dirty="0">
-              <a:latin typeface="NSimSun" pitchFamily="49" charset="-122"/>
-              <a:ea typeface="NSimSun" pitchFamily="49" charset="-122"/>
-            </a:endParaRPr>
+              <a:t>5 Principais Indústrias Transformadoras do Porto</a:t>
+            </a:r>
+          </a:p>
+        </p:txBody>
+      </p:sp>
+      <p:sp>
+        <p:nvSpPr>
+          <p:cNvPr id="3" name="CaixaDeTexto 2">
+            <a:extLst>
+              <a:ext uri="{FF2B5EF4-FFF2-40B4-BE49-F238E27FC236}">
+                <a16:creationId xmlns:a16="http://schemas.microsoft.com/office/drawing/2014/main" id="{BB572B82-7393-4E6D-AE27-44708B9F9C68}"/>
+              </a:ext>
+            </a:extLst>
+          </p:cNvPr>
+          <p:cNvSpPr txBox="1"/>
+          <p:nvPr/>
+        </p:nvSpPr>
+        <p:spPr>
+          <a:xfrm>
+            <a:off x="685800" y="4797152"/>
+            <a:ext cx="2377767" cy="1354217"/>
+          </a:xfrm>
+          <a:prstGeom prst="rect">
+            <a:avLst/>
+          </a:prstGeom>
+          <a:noFill/>
+        </p:spPr>
+        <p:txBody>
+          <a:bodyPr wrap="none" rtlCol="0">
+            <a:spAutoFit/>
+          </a:bodyPr>
+          <a:lstStyle/>
+          <a:p>
+            <a:r>
+              <a:rPr lang="pt-PT" dirty="0"/>
+              <a:t>Trabalho realizado por:</a:t>
+            </a:r>
+          </a:p>
+          <a:p>
+            <a:r>
+              <a:rPr lang="pt-PT" sz="1600" dirty="0"/>
+              <a:t>Afonso Ferreira	1DE</a:t>
+            </a:r>
+          </a:p>
+          <a:p>
+            <a:r>
+              <a:rPr lang="pt-PT" sz="1600" dirty="0"/>
+              <a:t>Bruno Guimarães	1DA</a:t>
+            </a:r>
+          </a:p>
+          <a:p>
+            <a:r>
+              <a:rPr lang="pt-PT" sz="1600" dirty="0"/>
+              <a:t>Jorge Pinto	1DE</a:t>
+            </a:r>
+          </a:p>
+          <a:p>
+            <a:r>
+              <a:rPr lang="pt-PT" sz="1600" dirty="0"/>
+              <a:t>Pedro </a:t>
+            </a:r>
+            <a:r>
+              <a:rPr lang="pt-PT" sz="1600" dirty="0" err="1"/>
+              <a:t>Reigado</a:t>
+            </a:r>
+            <a:r>
+              <a:rPr lang="pt-PT" sz="1600" dirty="0"/>
+              <a:t>	</a:t>
+            </a:r>
           </a:p>
         </p:txBody>
       </p:sp>
@@ -6533,17 +6617,10 @@
   <p:clrMapOvr>
     <a:masterClrMapping/>
   </p:clrMapOvr>
-  <p:timing>
-    <p:tnLst>
-      <p:par>
-        <p:cTn id="1" dur="indefinite" restart="never" nodeType="tmRoot"/>
-      </p:par>
-    </p:tnLst>
-  </p:timing>
 </p:sld>
 </file>
 
-<file path=ppt/slides/slide2.xml><?xml version="1.0" encoding="utf-8"?>
+<file path=ppt/slides/slide10.xml><?xml version="1.0" encoding="utf-8"?>
 <p:sld xmlns:a="http://schemas.openxmlformats.org/drawingml/2006/main" xmlns:r="http://schemas.openxmlformats.org/officeDocument/2006/relationships" xmlns:p="http://schemas.openxmlformats.org/presentationml/2006/main">
   <p:cSld>
     <p:spTree>
@@ -6560,48 +6637,15 @@
           <a:chExt cx="0" cy="0"/>
         </a:xfrm>
       </p:grpSpPr>
-      <p:pic>
-        <p:nvPicPr>
-          <p:cNvPr id="4" name="Marcador de Posição de Conteúdo 3" descr="20170127112046-vinhos20000.jpg"/>
-          <p:cNvPicPr>
-            <a:picLocks noGrp="1" noChangeAspect="1"/>
-          </p:cNvPicPr>
-          <p:nvPr>
-            <p:ph idx="1"/>
-          </p:nvPr>
-        </p:nvPicPr>
-        <p:blipFill>
-          <a:blip r:embed="rId2" cstate="print"/>
-          <a:stretch>
-            <a:fillRect/>
-          </a:stretch>
-        </p:blipFill>
-        <p:spPr>
-          <a:xfrm>
-            <a:off x="4967694" y="4077072"/>
-            <a:ext cx="4176306" cy="2780928"/>
-          </a:xfrm>
-        </p:spPr>
-      </p:pic>
-      <p:graphicFrame>
-        <p:nvGraphicFramePr>
-          <p:cNvPr id="7" name="Diagrama 6"/>
-          <p:cNvGraphicFramePr/>
-          <p:nvPr/>
-        </p:nvGraphicFramePr>
-        <p:xfrm>
-          <a:off x="611560" y="1397000"/>
-          <a:ext cx="8352928" cy="2608064"/>
-        </p:xfrm>
-        <a:graphic>
-          <a:graphicData uri="http://schemas.openxmlformats.org/drawingml/2006/diagram">
-            <dgm:relIds xmlns:dgm="http://schemas.openxmlformats.org/drawingml/2006/diagram" xmlns:r="http://schemas.openxmlformats.org/officeDocument/2006/relationships" r:dm="rId3" r:lo="rId4" r:qs="rId5" r:cs="rId6"/>
-          </a:graphicData>
-        </a:graphic>
-      </p:graphicFrame>
-      <p:sp>
-        <p:nvSpPr>
-          <p:cNvPr id="2" name="Título 1"/>
+      <p:sp>
+        <p:nvSpPr>
+          <p:cNvPr id="2" name="Título 1">
+            <a:extLst>
+              <a:ext uri="{FF2B5EF4-FFF2-40B4-BE49-F238E27FC236}">
+                <a16:creationId xmlns:a16="http://schemas.microsoft.com/office/drawing/2014/main" id="{F82B2445-5289-4CCC-BC69-3994A944CB9A}"/>
+              </a:ext>
+            </a:extLst>
+          </p:cNvPr>
           <p:cNvSpPr>
             <a:spLocks noGrp="1"/>
           </p:cNvSpPr>
@@ -6611,374 +6655,55 @@
         </p:nvSpPr>
         <p:spPr/>
         <p:txBody>
-          <a:bodyPr>
-            <a:normAutofit/>
-          </a:bodyPr>
+          <a:bodyPr/>
           <a:lstStyle/>
           <a:p>
             <a:r>
-              <a:rPr lang="pt-PT" sz="3200" dirty="0" smtClean="0">
-                <a:latin typeface="NSimSun" pitchFamily="49" charset="-122"/>
-                <a:ea typeface="NSimSun" pitchFamily="49" charset="-122"/>
-              </a:rPr>
-              <a:t>O que são as Industrias Transformadoras?</a:t>
-            </a:r>
-            <a:endParaRPr lang="pt-PT" sz="3200" dirty="0">
-              <a:latin typeface="NSimSun" pitchFamily="49" charset="-122"/>
-              <a:ea typeface="NSimSun" pitchFamily="49" charset="-122"/>
-            </a:endParaRPr>
+              <a:rPr lang="pt-PT" dirty="0"/>
+              <a:t>Tabela dos Critérios</a:t>
+            </a:r>
           </a:p>
         </p:txBody>
       </p:sp>
+      <p:sp>
+        <p:nvSpPr>
+          <p:cNvPr id="3" name="Marcador de Posição de Conteúdo 2">
+            <a:extLst>
+              <a:ext uri="{FF2B5EF4-FFF2-40B4-BE49-F238E27FC236}">
+                <a16:creationId xmlns:a16="http://schemas.microsoft.com/office/drawing/2014/main" id="{5EBBD839-A333-4CE3-9521-ABA52E5BF41C}"/>
+              </a:ext>
+            </a:extLst>
+          </p:cNvPr>
+          <p:cNvSpPr>
+            <a:spLocks noGrp="1"/>
+          </p:cNvSpPr>
+          <p:nvPr>
+            <p:ph idx="1"/>
+          </p:nvPr>
+        </p:nvSpPr>
+        <p:spPr/>
+        <p:txBody>
+          <a:bodyPr/>
+          <a:lstStyle/>
+          <a:p>
+            <a:endParaRPr lang="pt-PT" dirty="0"/>
+          </a:p>
+        </p:txBody>
+      </p:sp>
     </p:spTree>
+    <p:extLst>
+      <p:ext uri="{BB962C8B-B14F-4D97-AF65-F5344CB8AC3E}">
+        <p14:creationId xmlns:p14="http://schemas.microsoft.com/office/powerpoint/2010/main" val="399570486"/>
+      </p:ext>
+    </p:extLst>
   </p:cSld>
   <p:clrMapOvr>
     <a:masterClrMapping/>
   </p:clrMapOvr>
-  <p:timing>
-    <p:tnLst>
-      <p:par>
-        <p:cTn id="1" dur="indefinite" restart="never" nodeType="tmRoot"/>
-      </p:par>
-    </p:tnLst>
-  </p:timing>
 </p:sld>
 </file>
 
-<file path=ppt/slides/slide3.xml><?xml version="1.0" encoding="utf-8"?>
-<p:sld xmlns:a="http://schemas.openxmlformats.org/drawingml/2006/main" xmlns:r="http://schemas.openxmlformats.org/officeDocument/2006/relationships" xmlns:p="http://schemas.openxmlformats.org/presentationml/2006/main">
-  <p:cSld>
-    <p:spTree>
-      <p:nvGrpSpPr>
-        <p:cNvPr id="1" name=""/>
-        <p:cNvGrpSpPr/>
-        <p:nvPr/>
-      </p:nvGrpSpPr>
-      <p:grpSpPr>
-        <a:xfrm>
-          <a:off x="0" y="0"/>
-          <a:ext cx="0" cy="0"/>
-          <a:chOff x="0" y="0"/>
-          <a:chExt cx="0" cy="0"/>
-        </a:xfrm>
-      </p:grpSpPr>
-      <p:sp>
-        <p:nvSpPr>
-          <p:cNvPr id="6" name="CaixaDeTexto 5"/>
-          <p:cNvSpPr txBox="1"/>
-          <p:nvPr/>
-        </p:nvSpPr>
-        <p:spPr>
-          <a:xfrm>
-            <a:off x="3923928" y="5301208"/>
-            <a:ext cx="3240360" cy="646331"/>
-          </a:xfrm>
-          <a:prstGeom prst="rect">
-            <a:avLst/>
-          </a:prstGeom>
-          <a:noFill/>
-        </p:spPr>
-        <p:txBody>
-          <a:bodyPr wrap="square" rtlCol="0">
-            <a:spAutoFit/>
-          </a:bodyPr>
-          <a:lstStyle/>
-          <a:p>
-            <a:r>
-              <a:rPr lang="pt-PT" dirty="0">
-                <a:solidFill>
-                  <a:schemeClr val="bg1">
-                    <a:lumMod val="50000"/>
-                  </a:schemeClr>
-                </a:solidFill>
-                <a:latin typeface="Times New Roman" pitchFamily="18" charset="0"/>
-                <a:ea typeface="NSimSun" pitchFamily="49" charset="-122"/>
-                <a:cs typeface="Times New Roman" pitchFamily="18" charset="0"/>
-              </a:rPr>
-              <a:t>Fonte: Análise Informa D&amp;B</a:t>
-            </a:r>
-            <a:r>
-              <a:rPr lang="pt-PT" dirty="0" smtClean="0">
-                <a:solidFill>
-                  <a:schemeClr val="bg1">
-                    <a:lumMod val="50000"/>
-                  </a:schemeClr>
-                </a:solidFill>
-                <a:latin typeface="Times New Roman" pitchFamily="18" charset="0"/>
-                <a:ea typeface="NSimSun" pitchFamily="49" charset="-122"/>
-                <a:cs typeface="Times New Roman" pitchFamily="18" charset="0"/>
-              </a:rPr>
-              <a:t>.</a:t>
-            </a:r>
-          </a:p>
-          <a:p>
-            <a:r>
-              <a:rPr lang="pt-PT" dirty="0" smtClean="0">
-                <a:solidFill>
-                  <a:schemeClr val="bg1">
-                    <a:lumMod val="50000"/>
-                  </a:schemeClr>
-                </a:solidFill>
-                <a:latin typeface="Times New Roman" pitchFamily="18" charset="0"/>
-                <a:ea typeface="NSimSun" pitchFamily="49" charset="-122"/>
-                <a:cs typeface="Times New Roman" pitchFamily="18" charset="0"/>
-              </a:rPr>
-              <a:t>Período de análise : </a:t>
-            </a:r>
-            <a:r>
-              <a:rPr lang="pt-PT" dirty="0">
-                <a:solidFill>
-                  <a:schemeClr val="bg1">
-                    <a:lumMod val="50000"/>
-                  </a:schemeClr>
-                </a:solidFill>
-                <a:latin typeface="Times New Roman" pitchFamily="18" charset="0"/>
-                <a:ea typeface="NSimSun" pitchFamily="49" charset="-122"/>
-                <a:cs typeface="Times New Roman" pitchFamily="18" charset="0"/>
-              </a:rPr>
-              <a:t>2012-2015</a:t>
-            </a:r>
-          </a:p>
-        </p:txBody>
-      </p:sp>
-      <p:pic>
-        <p:nvPicPr>
-          <p:cNvPr id="4" name="Marcador de Posição de Conteúdo 3" descr="Capturar.PNG"/>
-          <p:cNvPicPr>
-            <a:picLocks noGrp="1" noChangeAspect="1"/>
-          </p:cNvPicPr>
-          <p:nvPr>
-            <p:ph idx="1"/>
-          </p:nvPr>
-        </p:nvPicPr>
-        <p:blipFill>
-          <a:blip r:embed="rId2" cstate="print"/>
-          <a:stretch>
-            <a:fillRect/>
-          </a:stretch>
-        </p:blipFill>
-        <p:spPr>
-          <a:xfrm>
-            <a:off x="1952836" y="836712"/>
-            <a:ext cx="5238329" cy="4539885"/>
-          </a:xfrm>
-          <a:ln>
-            <a:solidFill>
-              <a:schemeClr val="bg1"/>
-            </a:solidFill>
-          </a:ln>
-        </p:spPr>
-      </p:pic>
-      <p:sp>
-        <p:nvSpPr>
-          <p:cNvPr id="5" name="CaixaDeTexto 4"/>
-          <p:cNvSpPr txBox="1"/>
-          <p:nvPr/>
-        </p:nvSpPr>
-        <p:spPr>
-          <a:xfrm>
-            <a:off x="5147048" y="1484784"/>
-            <a:ext cx="3996952" cy="646331"/>
-          </a:xfrm>
-          <a:prstGeom prst="rect">
-            <a:avLst/>
-          </a:prstGeom>
-          <a:noFill/>
-        </p:spPr>
-        <p:txBody>
-          <a:bodyPr wrap="square" rtlCol="0">
-            <a:spAutoFit/>
-          </a:bodyPr>
-          <a:lstStyle/>
-          <a:p>
-            <a:r>
-              <a:rPr lang="pt-PT" dirty="0" smtClean="0">
-                <a:solidFill>
-                  <a:srgbClr val="00B0F0"/>
-                </a:solidFill>
-                <a:latin typeface="Times New Roman" pitchFamily="18" charset="0"/>
-                <a:ea typeface="NSimSun" pitchFamily="49" charset="-122"/>
-                <a:cs typeface="Times New Roman" pitchFamily="18" charset="0"/>
-              </a:rPr>
-              <a:t>ECE – Empresas de Crescimento Elevado</a:t>
-            </a:r>
-            <a:endParaRPr lang="pt-PT" dirty="0">
-              <a:solidFill>
-                <a:srgbClr val="00B0F0"/>
-              </a:solidFill>
-              <a:latin typeface="Times New Roman" pitchFamily="18" charset="0"/>
-              <a:ea typeface="NSimSun" pitchFamily="49" charset="-122"/>
-              <a:cs typeface="Times New Roman" pitchFamily="18" charset="0"/>
-            </a:endParaRPr>
-          </a:p>
-        </p:txBody>
-      </p:sp>
-    </p:spTree>
-  </p:cSld>
-  <p:clrMapOvr>
-    <a:masterClrMapping/>
-  </p:clrMapOvr>
-  <p:timing>
-    <p:tnLst>
-      <p:par>
-        <p:cTn id="1" dur="indefinite" restart="never" nodeType="tmRoot"/>
-      </p:par>
-    </p:tnLst>
-  </p:timing>
-</p:sld>
-</file>
-
-<file path=ppt/slides/slide4.xml><?xml version="1.0" encoding="utf-8"?>
-<p:sld xmlns:a="http://schemas.openxmlformats.org/drawingml/2006/main" xmlns:r="http://schemas.openxmlformats.org/officeDocument/2006/relationships" xmlns:p="http://schemas.openxmlformats.org/presentationml/2006/main">
-  <p:cSld>
-    <p:spTree>
-      <p:nvGrpSpPr>
-        <p:cNvPr id="1" name=""/>
-        <p:cNvGrpSpPr/>
-        <p:nvPr/>
-      </p:nvGrpSpPr>
-      <p:grpSpPr>
-        <a:xfrm>
-          <a:off x="0" y="0"/>
-          <a:ext cx="0" cy="0"/>
-          <a:chOff x="0" y="0"/>
-          <a:chExt cx="0" cy="0"/>
-        </a:xfrm>
-      </p:grpSpPr>
-      <p:pic>
-        <p:nvPicPr>
-          <p:cNvPr id="4" name="Marcador de Posição de Conteúdo 3" descr="20140930132314croayk.jpg"/>
-          <p:cNvPicPr>
-            <a:picLocks noGrp="1" noChangeAspect="1"/>
-          </p:cNvPicPr>
-          <p:nvPr>
-            <p:ph idx="1"/>
-          </p:nvPr>
-        </p:nvPicPr>
-        <p:blipFill>
-          <a:blip r:embed="rId2" cstate="print"/>
-          <a:stretch>
-            <a:fillRect/>
-          </a:stretch>
-        </p:blipFill>
-        <p:spPr>
-          <a:xfrm>
-            <a:off x="1727684" y="3302605"/>
-            <a:ext cx="5688632" cy="3555395"/>
-          </a:xfrm>
-        </p:spPr>
-      </p:pic>
-      <p:sp>
-        <p:nvSpPr>
-          <p:cNvPr id="2" name="Título 1"/>
-          <p:cNvSpPr>
-            <a:spLocks noGrp="1"/>
-          </p:cNvSpPr>
-          <p:nvPr>
-            <p:ph type="title"/>
-          </p:nvPr>
-        </p:nvSpPr>
-        <p:spPr/>
-        <p:txBody>
-          <a:bodyPr>
-            <a:normAutofit/>
-          </a:bodyPr>
-          <a:lstStyle/>
-          <a:p>
-            <a:r>
-              <a:rPr lang="pt-PT" sz="3200" dirty="0" smtClean="0">
-                <a:latin typeface="NSimSun" pitchFamily="49" charset="-122"/>
-                <a:ea typeface="NSimSun" pitchFamily="49" charset="-122"/>
-              </a:rPr>
-              <a:t>Critérios de Avaliação </a:t>
-            </a:r>
-            <a:endParaRPr lang="pt-PT" sz="3200" dirty="0">
-              <a:latin typeface="NSimSun" pitchFamily="49" charset="-122"/>
-              <a:ea typeface="NSimSun" pitchFamily="49" charset="-122"/>
-            </a:endParaRPr>
-          </a:p>
-        </p:txBody>
-      </p:sp>
-      <p:sp>
-        <p:nvSpPr>
-          <p:cNvPr id="6" name="CaixaDeTexto 5"/>
-          <p:cNvSpPr txBox="1"/>
-          <p:nvPr/>
-        </p:nvSpPr>
-        <p:spPr>
-          <a:xfrm>
-            <a:off x="899592" y="1556792"/>
-            <a:ext cx="7272808" cy="1200329"/>
-          </a:xfrm>
-          <a:prstGeom prst="rect">
-            <a:avLst/>
-          </a:prstGeom>
-          <a:noFill/>
-        </p:spPr>
-        <p:txBody>
-          <a:bodyPr wrap="square" rtlCol="0">
-            <a:spAutoFit/>
-          </a:bodyPr>
-          <a:lstStyle/>
-          <a:p>
-            <a:pPr>
-              <a:buFont typeface="Wingdings" pitchFamily="2" charset="2"/>
-              <a:buChar char="Ø"/>
-            </a:pPr>
-            <a:r>
-              <a:rPr lang="pt-PT" dirty="0" smtClean="0"/>
-              <a:t>Valor dos Negócios</a:t>
-            </a:r>
-          </a:p>
-          <a:p>
-            <a:pPr>
-              <a:buFont typeface="Wingdings" pitchFamily="2" charset="2"/>
-              <a:buChar char="Ø"/>
-            </a:pPr>
-            <a:r>
-              <a:rPr lang="pt-PT" dirty="0" smtClean="0"/>
-              <a:t>Critérios de Qualidade da Empresa</a:t>
-            </a:r>
-          </a:p>
-          <a:p>
-            <a:pPr>
-              <a:buFont typeface="Wingdings" pitchFamily="2" charset="2"/>
-              <a:buChar char="Ø"/>
-            </a:pPr>
-            <a:r>
-              <a:rPr lang="pt-PT" dirty="0" smtClean="0"/>
-              <a:t>Reconhecimento Nacional e Internacional</a:t>
-            </a:r>
-          </a:p>
-          <a:p>
-            <a:pPr>
-              <a:buFont typeface="Wingdings" pitchFamily="2" charset="2"/>
-              <a:buChar char="Ø"/>
-            </a:pPr>
-            <a:r>
-              <a:rPr lang="pt-PT" dirty="0" smtClean="0"/>
-              <a:t>Número de Colaboradores</a:t>
-            </a:r>
-            <a:endParaRPr lang="pt-PT" dirty="0"/>
-          </a:p>
-        </p:txBody>
-      </p:sp>
-    </p:spTree>
-  </p:cSld>
-  <p:clrMapOvr>
-    <a:masterClrMapping/>
-  </p:clrMapOvr>
-  <p:timing>
-    <p:tnLst>
-      <p:par>
-        <p:cTn id="1" dur="indefinite" restart="never" nodeType="tmRoot"/>
-      </p:par>
-    </p:tnLst>
-  </p:timing>
-</p:sld>
-</file>
-
-<file path=ppt/slides/slide5.xml><?xml version="1.0" encoding="utf-8"?>
+<file path=ppt/slides/slide11.xml><?xml version="1.0" encoding="utf-8"?>
 <p:sld xmlns:a="http://schemas.openxmlformats.org/drawingml/2006/main" xmlns:r="http://schemas.openxmlformats.org/officeDocument/2006/relationships" xmlns:p="http://schemas.openxmlformats.org/presentationml/2006/main">
   <p:cSld>
     <p:spTree>
@@ -7139,16 +6864,12 @@
           <a:p>
             <a:pPr algn="ctr"/>
             <a:r>
-              <a:rPr lang="pt-PT" sz="3200" dirty="0" smtClean="0">
-                <a:latin typeface="NSimSun" pitchFamily="49" charset="-122"/>
+              <a:rPr lang="pt-PT" sz="3200" dirty="0">
+                <a:latin typeface="+mj-lt"/>
                 <a:ea typeface="NSimSun" pitchFamily="49" charset="-122"/>
               </a:rPr>
               <a:t>Empresas Abordadas</a:t>
             </a:r>
-            <a:endParaRPr lang="pt-PT" sz="3200" dirty="0">
-              <a:latin typeface="NSimSun" pitchFamily="49" charset="-122"/>
-              <a:ea typeface="NSimSun" pitchFamily="49" charset="-122"/>
-            </a:endParaRPr>
           </a:p>
         </p:txBody>
       </p:sp>
@@ -7175,12 +6896,12 @@
           <a:lstStyle/>
           <a:p>
             <a:r>
-              <a:rPr lang="pt-PT" dirty="0" smtClean="0">
+              <a:rPr lang="pt-PT" dirty="0">
                 <a:hlinkClick r:id="rId8"/>
               </a:rPr>
               <a:t>https://www.diariodeatualidades.wixsite.com/empresasporto</a:t>
             </a:r>
-            <a:endParaRPr lang="pt-PT" dirty="0" smtClean="0"/>
+            <a:endParaRPr lang="pt-PT" dirty="0"/>
           </a:p>
           <a:p>
             <a:endParaRPr lang="pt-PT" dirty="0"/>
@@ -7192,13 +6913,1750 @@
   <p:clrMapOvr>
     <a:masterClrMapping/>
   </p:clrMapOvr>
-  <p:timing>
-    <p:tnLst>
-      <p:par>
-        <p:cTn id="1" dur="indefinite" restart="never" nodeType="tmRoot"/>
-      </p:par>
-    </p:tnLst>
-  </p:timing>
+</p:sld>
+</file>
+
+<file path=ppt/slides/slide2.xml><?xml version="1.0" encoding="utf-8"?>
+<p:sld xmlns:a="http://schemas.openxmlformats.org/drawingml/2006/main" xmlns:r="http://schemas.openxmlformats.org/officeDocument/2006/relationships" xmlns:p="http://schemas.openxmlformats.org/presentationml/2006/main">
+  <p:cSld>
+    <p:spTree>
+      <p:nvGrpSpPr>
+        <p:cNvPr id="1" name=""/>
+        <p:cNvGrpSpPr/>
+        <p:nvPr/>
+      </p:nvGrpSpPr>
+      <p:grpSpPr>
+        <a:xfrm>
+          <a:off x="0" y="0"/>
+          <a:ext cx="0" cy="0"/>
+          <a:chOff x="0" y="0"/>
+          <a:chExt cx="0" cy="0"/>
+        </a:xfrm>
+      </p:grpSpPr>
+      <p:pic>
+        <p:nvPicPr>
+          <p:cNvPr id="4" name="Marcador de Posição de Conteúdo 3" descr="20170127112046-vinhos20000.jpg"/>
+          <p:cNvPicPr>
+            <a:picLocks noGrp="1" noChangeAspect="1"/>
+          </p:cNvPicPr>
+          <p:nvPr>
+            <p:ph idx="1"/>
+          </p:nvPr>
+        </p:nvPicPr>
+        <p:blipFill>
+          <a:blip r:embed="rId2" cstate="print"/>
+          <a:stretch>
+            <a:fillRect/>
+          </a:stretch>
+        </p:blipFill>
+        <p:spPr>
+          <a:xfrm>
+            <a:off x="2019227" y="1427547"/>
+            <a:ext cx="5105542" cy="3568783"/>
+          </a:xfrm>
+        </p:spPr>
+      </p:pic>
+      <p:graphicFrame>
+        <p:nvGraphicFramePr>
+          <p:cNvPr id="7" name="Diagrama 6"/>
+          <p:cNvGraphicFramePr/>
+          <p:nvPr>
+            <p:extLst>
+              <p:ext uri="{D42A27DB-BD31-4B8C-83A1-F6EECF244321}">
+                <p14:modId xmlns:p14="http://schemas.microsoft.com/office/powerpoint/2010/main" val="1536524942"/>
+              </p:ext>
+            </p:extLst>
+          </p:nvPr>
+        </p:nvGraphicFramePr>
+        <p:xfrm>
+          <a:off x="395536" y="1268760"/>
+          <a:ext cx="8352928" cy="2608064"/>
+        </p:xfrm>
+        <a:graphic>
+          <a:graphicData uri="http://schemas.openxmlformats.org/drawingml/2006/diagram">
+            <dgm:relIds xmlns:dgm="http://schemas.openxmlformats.org/drawingml/2006/diagram" xmlns:r="http://schemas.openxmlformats.org/officeDocument/2006/relationships" r:dm="rId3" r:lo="rId4" r:qs="rId5" r:cs="rId6"/>
+          </a:graphicData>
+        </a:graphic>
+      </p:graphicFrame>
+      <p:sp>
+        <p:nvSpPr>
+          <p:cNvPr id="2" name="Título 1"/>
+          <p:cNvSpPr>
+            <a:spLocks noGrp="1"/>
+          </p:cNvSpPr>
+          <p:nvPr>
+            <p:ph type="title"/>
+          </p:nvPr>
+        </p:nvSpPr>
+        <p:spPr>
+          <a:xfrm>
+            <a:off x="457199" y="66929"/>
+            <a:ext cx="8229600" cy="1143000"/>
+          </a:xfrm>
+        </p:spPr>
+        <p:txBody>
+          <a:bodyPr>
+            <a:normAutofit/>
+          </a:bodyPr>
+          <a:lstStyle/>
+          <a:p>
+            <a:r>
+              <a:rPr lang="pt-PT" sz="3200" dirty="0">
+                <a:ea typeface="NSimSun" pitchFamily="49" charset="-122"/>
+              </a:rPr>
+              <a:t>O que são as Indústrias Transformadoras?</a:t>
+            </a:r>
+          </a:p>
+        </p:txBody>
+      </p:sp>
+      <p:sp>
+        <p:nvSpPr>
+          <p:cNvPr id="3" name="Seta: Curvada para Baixo 2">
+            <a:extLst>
+              <a:ext uri="{FF2B5EF4-FFF2-40B4-BE49-F238E27FC236}">
+                <a16:creationId xmlns:a16="http://schemas.microsoft.com/office/drawing/2014/main" id="{1E15BC07-344F-451B-8E52-1BC87CC47DFA}"/>
+              </a:ext>
+            </a:extLst>
+          </p:cNvPr>
+          <p:cNvSpPr/>
+          <p:nvPr/>
+        </p:nvSpPr>
+        <p:spPr>
+          <a:xfrm rot="10800000">
+            <a:off x="1583706" y="3270770"/>
+            <a:ext cx="5976585" cy="2030437"/>
+          </a:xfrm>
+          <a:prstGeom prst="curvedDownArrow">
+            <a:avLst/>
+          </a:prstGeom>
+          <a:solidFill>
+            <a:schemeClr val="bg1">
+              <a:lumMod val="65000"/>
+            </a:schemeClr>
+          </a:solidFill>
+          <a:ln>
+            <a:noFill/>
+          </a:ln>
+          <a:effectLst>
+            <a:outerShdw blurRad="50800" dist="38100" dir="2700000" algn="tl" rotWithShape="0">
+              <a:prstClr val="black">
+                <a:alpha val="40000"/>
+              </a:prstClr>
+            </a:outerShdw>
+          </a:effectLst>
+        </p:spPr>
+        <p:style>
+          <a:lnRef idx="2">
+            <a:schemeClr val="accent1">
+              <a:shade val="50000"/>
+            </a:schemeClr>
+          </a:lnRef>
+          <a:fillRef idx="1">
+            <a:schemeClr val="accent1"/>
+          </a:fillRef>
+          <a:effectRef idx="0">
+            <a:schemeClr val="accent1"/>
+          </a:effectRef>
+          <a:fontRef idx="minor">
+            <a:schemeClr val="lt1"/>
+          </a:fontRef>
+        </p:style>
+        <p:txBody>
+          <a:bodyPr rtlCol="0" anchor="ctr"/>
+          <a:lstStyle/>
+          <a:p>
+            <a:pPr algn="ctr"/>
+            <a:endParaRPr lang="pt-PT">
+              <a:solidFill>
+                <a:schemeClr val="tx1"/>
+              </a:solidFill>
+            </a:endParaRPr>
+          </a:p>
+        </p:txBody>
+      </p:sp>
+    </p:spTree>
+  </p:cSld>
+  <p:clrMapOvr>
+    <a:masterClrMapping/>
+  </p:clrMapOvr>
+</p:sld>
+</file>
+
+<file path=ppt/slides/slide3.xml><?xml version="1.0" encoding="utf-8"?>
+<p:sld xmlns:a="http://schemas.openxmlformats.org/drawingml/2006/main" xmlns:r="http://schemas.openxmlformats.org/officeDocument/2006/relationships" xmlns:p="http://schemas.openxmlformats.org/presentationml/2006/main">
+  <p:cSld>
+    <p:spTree>
+      <p:nvGrpSpPr>
+        <p:cNvPr id="1" name=""/>
+        <p:cNvGrpSpPr/>
+        <p:nvPr/>
+      </p:nvGrpSpPr>
+      <p:grpSpPr>
+        <a:xfrm>
+          <a:off x="0" y="0"/>
+          <a:ext cx="0" cy="0"/>
+          <a:chOff x="0" y="0"/>
+          <a:chExt cx="0" cy="0"/>
+        </a:xfrm>
+      </p:grpSpPr>
+      <p:sp>
+        <p:nvSpPr>
+          <p:cNvPr id="6" name="CaixaDeTexto 5"/>
+          <p:cNvSpPr txBox="1"/>
+          <p:nvPr/>
+        </p:nvSpPr>
+        <p:spPr>
+          <a:xfrm>
+            <a:off x="6156176" y="6097325"/>
+            <a:ext cx="3240360" cy="584775"/>
+          </a:xfrm>
+          <a:prstGeom prst="rect">
+            <a:avLst/>
+          </a:prstGeom>
+          <a:noFill/>
+        </p:spPr>
+        <p:txBody>
+          <a:bodyPr wrap="square" rtlCol="0">
+            <a:spAutoFit/>
+          </a:bodyPr>
+          <a:lstStyle/>
+          <a:p>
+            <a:r>
+              <a:rPr lang="pt-PT" sz="1600" dirty="0">
+                <a:solidFill>
+                  <a:schemeClr val="bg1">
+                    <a:lumMod val="50000"/>
+                  </a:schemeClr>
+                </a:solidFill>
+                <a:ea typeface="NSimSun" pitchFamily="49" charset="-122"/>
+                <a:cs typeface="Times New Roman" pitchFamily="18" charset="0"/>
+              </a:rPr>
+              <a:t>Fonte: Análise Informa D&amp;B</a:t>
+            </a:r>
+          </a:p>
+          <a:p>
+            <a:r>
+              <a:rPr lang="pt-PT" sz="1600" dirty="0">
+                <a:solidFill>
+                  <a:schemeClr val="bg1">
+                    <a:lumMod val="50000"/>
+                  </a:schemeClr>
+                </a:solidFill>
+                <a:ea typeface="NSimSun" pitchFamily="49" charset="-122"/>
+                <a:cs typeface="Times New Roman" pitchFamily="18" charset="0"/>
+              </a:rPr>
+              <a:t>Período de análise : 2012-2015</a:t>
+            </a:r>
+          </a:p>
+        </p:txBody>
+      </p:sp>
+      <p:pic>
+        <p:nvPicPr>
+          <p:cNvPr id="4" name="Marcador de Posição de Conteúdo 3" descr="Capturar.PNG"/>
+          <p:cNvPicPr>
+            <a:picLocks noGrp="1" noChangeAspect="1"/>
+          </p:cNvPicPr>
+          <p:nvPr>
+            <p:ph idx="1"/>
+          </p:nvPr>
+        </p:nvPicPr>
+        <p:blipFill rotWithShape="1">
+          <a:blip r:embed="rId2" cstate="print"/>
+          <a:srcRect t="11105" b="37098"/>
+          <a:stretch/>
+        </p:blipFill>
+        <p:spPr>
+          <a:xfrm>
+            <a:off x="1979712" y="2996952"/>
+            <a:ext cx="5238329" cy="2351569"/>
+          </a:xfrm>
+          <a:ln>
+            <a:solidFill>
+              <a:schemeClr val="bg1"/>
+            </a:solidFill>
+          </a:ln>
+        </p:spPr>
+      </p:pic>
+      <p:sp>
+        <p:nvSpPr>
+          <p:cNvPr id="5" name="CaixaDeTexto 4"/>
+          <p:cNvSpPr txBox="1"/>
+          <p:nvPr/>
+        </p:nvSpPr>
+        <p:spPr>
+          <a:xfrm>
+            <a:off x="467544" y="5342419"/>
+            <a:ext cx="3815916" cy="338554"/>
+          </a:xfrm>
+          <a:prstGeom prst="rect">
+            <a:avLst/>
+          </a:prstGeom>
+          <a:noFill/>
+        </p:spPr>
+        <p:txBody>
+          <a:bodyPr wrap="square" rtlCol="0">
+            <a:spAutoFit/>
+          </a:bodyPr>
+          <a:lstStyle/>
+          <a:p>
+            <a:pPr algn="ctr"/>
+            <a:r>
+              <a:rPr lang="pt-PT" sz="1600" dirty="0">
+                <a:solidFill>
+                  <a:srgbClr val="00B0F0"/>
+                </a:solidFill>
+                <a:ea typeface="NSimSun" pitchFamily="49" charset="-122"/>
+                <a:cs typeface="Times New Roman" pitchFamily="18" charset="0"/>
+              </a:rPr>
+              <a:t>ECE – Empresas de Crescimento Elevado</a:t>
+            </a:r>
+          </a:p>
+        </p:txBody>
+      </p:sp>
+      <p:sp>
+        <p:nvSpPr>
+          <p:cNvPr id="2" name="CaixaDeTexto 1">
+            <a:extLst>
+              <a:ext uri="{FF2B5EF4-FFF2-40B4-BE49-F238E27FC236}">
+                <a16:creationId xmlns:a16="http://schemas.microsoft.com/office/drawing/2014/main" id="{3DFBA135-C6E8-4798-A5A3-EC7B7D3C78B2}"/>
+              </a:ext>
+            </a:extLst>
+          </p:cNvPr>
+          <p:cNvSpPr txBox="1"/>
+          <p:nvPr/>
+        </p:nvSpPr>
+        <p:spPr>
+          <a:xfrm>
+            <a:off x="5203200" y="5342419"/>
+            <a:ext cx="1520673" cy="338554"/>
+          </a:xfrm>
+          <a:prstGeom prst="rect">
+            <a:avLst/>
+          </a:prstGeom>
+          <a:noFill/>
+        </p:spPr>
+        <p:txBody>
+          <a:bodyPr wrap="none" rtlCol="0">
+            <a:spAutoFit/>
+          </a:bodyPr>
+          <a:lstStyle/>
+          <a:p>
+            <a:r>
+              <a:rPr lang="pt-PT" sz="1600" dirty="0">
+                <a:solidFill>
+                  <a:srgbClr val="FF0000"/>
+                </a:solidFill>
+              </a:rPr>
+              <a:t>Emprego Criado</a:t>
+            </a:r>
+          </a:p>
+        </p:txBody>
+      </p:sp>
+      <p:sp>
+        <p:nvSpPr>
+          <p:cNvPr id="3" name="CaixaDeTexto 2">
+            <a:extLst>
+              <a:ext uri="{FF2B5EF4-FFF2-40B4-BE49-F238E27FC236}">
+                <a16:creationId xmlns:a16="http://schemas.microsoft.com/office/drawing/2014/main" id="{1EE1A092-6AC1-4F49-A9B8-9372E26FC13C}"/>
+              </a:ext>
+            </a:extLst>
+          </p:cNvPr>
+          <p:cNvSpPr txBox="1"/>
+          <p:nvPr/>
+        </p:nvSpPr>
+        <p:spPr>
+          <a:xfrm>
+            <a:off x="3393257" y="692696"/>
+            <a:ext cx="2411238" cy="584775"/>
+          </a:xfrm>
+          <a:prstGeom prst="rect">
+            <a:avLst/>
+          </a:prstGeom>
+          <a:noFill/>
+        </p:spPr>
+        <p:txBody>
+          <a:bodyPr wrap="none" rtlCol="0">
+            <a:spAutoFit/>
+          </a:bodyPr>
+          <a:lstStyle/>
+          <a:p>
+            <a:pPr algn="ctr"/>
+            <a:r>
+              <a:rPr lang="pt-PT" sz="3200" dirty="0">
+                <a:latin typeface="+mj-lt"/>
+              </a:rPr>
+              <a:t>Perfil Setorial</a:t>
+            </a:r>
+          </a:p>
+        </p:txBody>
+      </p:sp>
+      <p:sp>
+        <p:nvSpPr>
+          <p:cNvPr id="7" name="CaixaDeTexto 6">
+            <a:extLst>
+              <a:ext uri="{FF2B5EF4-FFF2-40B4-BE49-F238E27FC236}">
+                <a16:creationId xmlns:a16="http://schemas.microsoft.com/office/drawing/2014/main" id="{8300F639-36FE-46E4-BB2A-D83E13414B5A}"/>
+              </a:ext>
+            </a:extLst>
+          </p:cNvPr>
+          <p:cNvSpPr txBox="1"/>
+          <p:nvPr/>
+        </p:nvSpPr>
+        <p:spPr>
+          <a:xfrm>
+            <a:off x="866828" y="1359565"/>
+            <a:ext cx="7464096" cy="400110"/>
+          </a:xfrm>
+          <a:prstGeom prst="rect">
+            <a:avLst/>
+          </a:prstGeom>
+          <a:noFill/>
+        </p:spPr>
+        <p:txBody>
+          <a:bodyPr wrap="none" rtlCol="0">
+            <a:spAutoFit/>
+          </a:bodyPr>
+          <a:lstStyle/>
+          <a:p>
+            <a:pPr algn="ctr"/>
+            <a:r>
+              <a:rPr lang="pt-PT" sz="2000" dirty="0"/>
+              <a:t>DISTRIBUIÇÃO DAS ECE E EMPREGO CRIADO NOS PRINCIPAIS SETORES</a:t>
+            </a:r>
+          </a:p>
+        </p:txBody>
+      </p:sp>
+      <p:sp>
+        <p:nvSpPr>
+          <p:cNvPr id="9" name="CaixaDeTexto 8">
+            <a:extLst>
+              <a:ext uri="{FF2B5EF4-FFF2-40B4-BE49-F238E27FC236}">
+                <a16:creationId xmlns:a16="http://schemas.microsoft.com/office/drawing/2014/main" id="{FEA044BB-9DD0-4178-972C-28D9D4C5E367}"/>
+              </a:ext>
+            </a:extLst>
+          </p:cNvPr>
+          <p:cNvSpPr txBox="1"/>
+          <p:nvPr/>
+        </p:nvSpPr>
+        <p:spPr>
+          <a:xfrm>
+            <a:off x="866829" y="2204864"/>
+            <a:ext cx="7377580" cy="646331"/>
+          </a:xfrm>
+          <a:prstGeom prst="rect">
+            <a:avLst/>
+          </a:prstGeom>
+          <a:noFill/>
+        </p:spPr>
+        <p:txBody>
+          <a:bodyPr wrap="square" rtlCol="0">
+            <a:spAutoFit/>
+          </a:bodyPr>
+          <a:lstStyle/>
+          <a:p>
+            <a:pPr marL="285750" indent="-285750">
+              <a:buFont typeface="Arial" panose="020B0604020202020204" pitchFamily="34" charset="0"/>
+              <a:buChar char="•"/>
+            </a:pPr>
+            <a:r>
+              <a:rPr lang="pt-PT" dirty="0"/>
+              <a:t>Indústrias transformadoras são o setor com mais ECE e com a segunda maior taxa de empregabilidade.</a:t>
+            </a:r>
+          </a:p>
+        </p:txBody>
+      </p:sp>
+    </p:spTree>
+  </p:cSld>
+  <p:clrMapOvr>
+    <a:masterClrMapping/>
+  </p:clrMapOvr>
+</p:sld>
+</file>
+
+<file path=ppt/slides/slide4.xml><?xml version="1.0" encoding="utf-8"?>
+<p:sld xmlns:a="http://schemas.openxmlformats.org/drawingml/2006/main" xmlns:r="http://schemas.openxmlformats.org/officeDocument/2006/relationships" xmlns:p="http://schemas.openxmlformats.org/presentationml/2006/main">
+  <p:cSld>
+    <p:spTree>
+      <p:nvGrpSpPr>
+        <p:cNvPr id="1" name=""/>
+        <p:cNvGrpSpPr/>
+        <p:nvPr/>
+      </p:nvGrpSpPr>
+      <p:grpSpPr>
+        <a:xfrm>
+          <a:off x="0" y="0"/>
+          <a:ext cx="0" cy="0"/>
+          <a:chOff x="0" y="0"/>
+          <a:chExt cx="0" cy="0"/>
+        </a:xfrm>
+      </p:grpSpPr>
+      <p:pic>
+        <p:nvPicPr>
+          <p:cNvPr id="4" name="Marcador de Posição de Conteúdo 3" descr="20140930132314croayk.jpg"/>
+          <p:cNvPicPr>
+            <a:picLocks noGrp="1" noChangeAspect="1"/>
+          </p:cNvPicPr>
+          <p:nvPr>
+            <p:ph idx="1"/>
+          </p:nvPr>
+        </p:nvPicPr>
+        <p:blipFill>
+          <a:blip r:embed="rId2" cstate="print"/>
+          <a:stretch>
+            <a:fillRect/>
+          </a:stretch>
+        </p:blipFill>
+        <p:spPr>
+          <a:xfrm>
+            <a:off x="1727684" y="3302605"/>
+            <a:ext cx="5688632" cy="3555395"/>
+          </a:xfrm>
+        </p:spPr>
+      </p:pic>
+      <p:sp>
+        <p:nvSpPr>
+          <p:cNvPr id="2" name="Título 1"/>
+          <p:cNvSpPr>
+            <a:spLocks noGrp="1"/>
+          </p:cNvSpPr>
+          <p:nvPr>
+            <p:ph type="title"/>
+          </p:nvPr>
+        </p:nvSpPr>
+        <p:spPr/>
+        <p:txBody>
+          <a:bodyPr>
+            <a:normAutofit/>
+          </a:bodyPr>
+          <a:lstStyle/>
+          <a:p>
+            <a:r>
+              <a:rPr lang="pt-PT" sz="3200" dirty="0">
+                <a:ea typeface="NSimSun" pitchFamily="49" charset="-122"/>
+              </a:rPr>
+              <a:t>Critérios de Avaliação </a:t>
+            </a:r>
+          </a:p>
+        </p:txBody>
+      </p:sp>
+      <p:sp>
+        <p:nvSpPr>
+          <p:cNvPr id="6" name="CaixaDeTexto 5"/>
+          <p:cNvSpPr txBox="1"/>
+          <p:nvPr/>
+        </p:nvSpPr>
+        <p:spPr>
+          <a:xfrm>
+            <a:off x="899592" y="1556792"/>
+            <a:ext cx="7272808" cy="1200329"/>
+          </a:xfrm>
+          <a:prstGeom prst="rect">
+            <a:avLst/>
+          </a:prstGeom>
+          <a:noFill/>
+        </p:spPr>
+        <p:txBody>
+          <a:bodyPr wrap="square" rtlCol="0">
+            <a:spAutoFit/>
+          </a:bodyPr>
+          <a:lstStyle/>
+          <a:p>
+            <a:pPr marL="285750" indent="-285750">
+              <a:buFont typeface="Arial" panose="020B0604020202020204" pitchFamily="34" charset="0"/>
+              <a:buChar char="•"/>
+            </a:pPr>
+            <a:r>
+              <a:rPr lang="pt-PT" dirty="0"/>
+              <a:t>Volume dos Negócios</a:t>
+            </a:r>
+          </a:p>
+          <a:p>
+            <a:pPr marL="285750" indent="-285750">
+              <a:buFont typeface="Arial" panose="020B0604020202020204" pitchFamily="34" charset="0"/>
+              <a:buChar char="•"/>
+            </a:pPr>
+            <a:r>
+              <a:rPr lang="pt-PT" dirty="0"/>
+              <a:t>Critérios de Qualidade da Empresa</a:t>
+            </a:r>
+          </a:p>
+          <a:p>
+            <a:pPr marL="285750" indent="-285750">
+              <a:buFont typeface="Arial" panose="020B0604020202020204" pitchFamily="34" charset="0"/>
+              <a:buChar char="•"/>
+            </a:pPr>
+            <a:r>
+              <a:rPr lang="pt-PT" dirty="0"/>
+              <a:t>Reconhecimento Nacional e Internacional</a:t>
+            </a:r>
+          </a:p>
+          <a:p>
+            <a:pPr marL="285750" indent="-285750">
+              <a:buFont typeface="Arial" panose="020B0604020202020204" pitchFamily="34" charset="0"/>
+              <a:buChar char="•"/>
+            </a:pPr>
+            <a:r>
+              <a:rPr lang="pt-PT" dirty="0"/>
+              <a:t>Número de Colaboradores</a:t>
+            </a:r>
+          </a:p>
+        </p:txBody>
+      </p:sp>
+    </p:spTree>
+  </p:cSld>
+  <p:clrMapOvr>
+    <a:masterClrMapping/>
+  </p:clrMapOvr>
+</p:sld>
+</file>
+
+<file path=ppt/slides/slide5.xml><?xml version="1.0" encoding="utf-8"?>
+<p:sld xmlns:a="http://schemas.openxmlformats.org/drawingml/2006/main" xmlns:r="http://schemas.openxmlformats.org/officeDocument/2006/relationships" xmlns:p="http://schemas.openxmlformats.org/presentationml/2006/main">
+  <p:cSld>
+    <p:spTree>
+      <p:nvGrpSpPr>
+        <p:cNvPr id="1" name=""/>
+        <p:cNvGrpSpPr/>
+        <p:nvPr/>
+      </p:nvGrpSpPr>
+      <p:grpSpPr>
+        <a:xfrm>
+          <a:off x="0" y="0"/>
+          <a:ext cx="0" cy="0"/>
+          <a:chOff x="0" y="0"/>
+          <a:chExt cx="0" cy="0"/>
+        </a:xfrm>
+      </p:grpSpPr>
+      <p:sp>
+        <p:nvSpPr>
+          <p:cNvPr id="3" name="Marcador de Posição de Conteúdo 2">
+            <a:extLst>
+              <a:ext uri="{FF2B5EF4-FFF2-40B4-BE49-F238E27FC236}">
+                <a16:creationId xmlns:a16="http://schemas.microsoft.com/office/drawing/2014/main" id="{326CF2E5-18E0-4371-96D0-022B6AFF6856}"/>
+              </a:ext>
+            </a:extLst>
+          </p:cNvPr>
+          <p:cNvSpPr>
+            <a:spLocks noGrp="1"/>
+          </p:cNvSpPr>
+          <p:nvPr>
+            <p:ph idx="1"/>
+          </p:nvPr>
+        </p:nvSpPr>
+        <p:spPr/>
+        <p:txBody>
+          <a:bodyPr>
+            <a:normAutofit/>
+          </a:bodyPr>
+          <a:lstStyle/>
+          <a:p>
+            <a:pPr algn="just"/>
+            <a:r>
+              <a:rPr lang="pt-PT" sz="1800" dirty="0"/>
+              <a:t>Empresa agroalimentar, fundada em 1996, especializada em lacticínios e derivados.</a:t>
+            </a:r>
+          </a:p>
+          <a:p>
+            <a:pPr algn="just"/>
+            <a:r>
+              <a:rPr lang="pt-PT" sz="1800" dirty="0"/>
+              <a:t>Este grupo é proprietário de grandes marcas.</a:t>
+            </a:r>
+          </a:p>
+          <a:p>
+            <a:pPr algn="just"/>
+            <a:endParaRPr lang="pt-PT" sz="1800" dirty="0"/>
+          </a:p>
+          <a:p>
+            <a:pPr algn="just"/>
+            <a:r>
+              <a:rPr lang="pt-PT" sz="1800" dirty="0"/>
+              <a:t>Mimosa foi a marca mais escolhida pelos portugueses, cerca de 33 milhões de vezes.</a:t>
+            </a:r>
+          </a:p>
+          <a:p>
+            <a:pPr algn="just"/>
+            <a:endParaRPr lang="pt-PT" sz="1800" dirty="0"/>
+          </a:p>
+          <a:p>
+            <a:pPr algn="just"/>
+            <a:r>
+              <a:rPr lang="pt-PT" sz="1800" dirty="0"/>
+              <a:t>Esta empresa recebe certificados de Qualidade desde a sua fundação, pela sua excelência e dedicação na Segurança Alimentar.</a:t>
+            </a:r>
+          </a:p>
+          <a:p>
+            <a:pPr algn="just"/>
+            <a:endParaRPr lang="pt-PT" sz="1800" dirty="0"/>
+          </a:p>
+        </p:txBody>
+      </p:sp>
+      <p:pic>
+        <p:nvPicPr>
+          <p:cNvPr id="4" name="Imagem 3" descr="lactogal_sem_descritivo_logo.jpg">
+            <a:extLst>
+              <a:ext uri="{FF2B5EF4-FFF2-40B4-BE49-F238E27FC236}">
+                <a16:creationId xmlns:a16="http://schemas.microsoft.com/office/drawing/2014/main" id="{EE1C1093-182E-4582-A162-53F2D3D1E0AC}"/>
+              </a:ext>
+            </a:extLst>
+          </p:cNvPr>
+          <p:cNvPicPr>
+            <a:picLocks noChangeAspect="1"/>
+          </p:cNvPicPr>
+          <p:nvPr/>
+        </p:nvPicPr>
+        <p:blipFill>
+          <a:blip r:embed="rId2" cstate="print"/>
+          <a:stretch>
+            <a:fillRect/>
+          </a:stretch>
+        </p:blipFill>
+        <p:spPr>
+          <a:xfrm>
+            <a:off x="2412000" y="432056"/>
+            <a:ext cx="4320000" cy="828164"/>
+          </a:xfrm>
+          <a:prstGeom prst="rect">
+            <a:avLst/>
+          </a:prstGeom>
+        </p:spPr>
+      </p:pic>
+      <p:pic>
+        <p:nvPicPr>
+          <p:cNvPr id="5" name="Imagem 4">
+            <a:extLst>
+              <a:ext uri="{FF2B5EF4-FFF2-40B4-BE49-F238E27FC236}">
+                <a16:creationId xmlns:a16="http://schemas.microsoft.com/office/drawing/2014/main" id="{68F01C3F-72F2-48E9-9917-735171767B21}"/>
+              </a:ext>
+            </a:extLst>
+          </p:cNvPr>
+          <p:cNvPicPr>
+            <a:picLocks noChangeAspect="1"/>
+          </p:cNvPicPr>
+          <p:nvPr/>
+        </p:nvPicPr>
+        <p:blipFill>
+          <a:blip r:embed="rId3"/>
+          <a:stretch>
+            <a:fillRect/>
+          </a:stretch>
+        </p:blipFill>
+        <p:spPr>
+          <a:xfrm>
+            <a:off x="5292080" y="2060848"/>
+            <a:ext cx="1343025" cy="866775"/>
+          </a:xfrm>
+          <a:prstGeom prst="rect">
+            <a:avLst/>
+          </a:prstGeom>
+        </p:spPr>
+      </p:pic>
+      <p:pic>
+        <p:nvPicPr>
+          <p:cNvPr id="6" name="Imagem 5">
+            <a:extLst>
+              <a:ext uri="{FF2B5EF4-FFF2-40B4-BE49-F238E27FC236}">
+                <a16:creationId xmlns:a16="http://schemas.microsoft.com/office/drawing/2014/main" id="{882200B6-73C7-4E23-8143-1648E06B765B}"/>
+              </a:ext>
+            </a:extLst>
+          </p:cNvPr>
+          <p:cNvPicPr>
+            <a:picLocks noChangeAspect="1"/>
+          </p:cNvPicPr>
+          <p:nvPr/>
+        </p:nvPicPr>
+        <p:blipFill>
+          <a:blip r:embed="rId4"/>
+          <a:stretch>
+            <a:fillRect/>
+          </a:stretch>
+        </p:blipFill>
+        <p:spPr>
+          <a:xfrm>
+            <a:off x="6516216" y="2041797"/>
+            <a:ext cx="1019175" cy="904875"/>
+          </a:xfrm>
+          <a:prstGeom prst="rect">
+            <a:avLst/>
+          </a:prstGeom>
+        </p:spPr>
+      </p:pic>
+      <p:pic>
+        <p:nvPicPr>
+          <p:cNvPr id="7" name="Imagem 6">
+            <a:extLst>
+              <a:ext uri="{FF2B5EF4-FFF2-40B4-BE49-F238E27FC236}">
+                <a16:creationId xmlns:a16="http://schemas.microsoft.com/office/drawing/2014/main" id="{A8C9605E-6D49-475F-BB20-58619D00850B}"/>
+              </a:ext>
+            </a:extLst>
+          </p:cNvPr>
+          <p:cNvPicPr>
+            <a:picLocks noChangeAspect="1"/>
+          </p:cNvPicPr>
+          <p:nvPr/>
+        </p:nvPicPr>
+        <p:blipFill>
+          <a:blip r:embed="rId5"/>
+          <a:stretch>
+            <a:fillRect/>
+          </a:stretch>
+        </p:blipFill>
+        <p:spPr>
+          <a:xfrm>
+            <a:off x="7535391" y="2060848"/>
+            <a:ext cx="1333500" cy="895350"/>
+          </a:xfrm>
+          <a:prstGeom prst="rect">
+            <a:avLst/>
+          </a:prstGeom>
+        </p:spPr>
+      </p:pic>
+      <p:sp>
+        <p:nvSpPr>
+          <p:cNvPr id="2" name="CaixaDeTexto 1">
+            <a:extLst>
+              <a:ext uri="{FF2B5EF4-FFF2-40B4-BE49-F238E27FC236}">
+                <a16:creationId xmlns:a16="http://schemas.microsoft.com/office/drawing/2014/main" id="{940BAE3B-0037-4AC6-98F8-E2C6F6A52294}"/>
+              </a:ext>
+            </a:extLst>
+          </p:cNvPr>
+          <p:cNvSpPr txBox="1"/>
+          <p:nvPr/>
+        </p:nvSpPr>
+        <p:spPr>
+          <a:xfrm>
+            <a:off x="7114466" y="3274921"/>
+            <a:ext cx="1821332" cy="461665"/>
+          </a:xfrm>
+          <a:prstGeom prst="rect">
+            <a:avLst/>
+          </a:prstGeom>
+          <a:noFill/>
+        </p:spPr>
+        <p:txBody>
+          <a:bodyPr wrap="none" rtlCol="0">
+            <a:spAutoFit/>
+          </a:bodyPr>
+          <a:lstStyle/>
+          <a:p>
+            <a:r>
+              <a:rPr lang="pt-PT" sz="600" dirty="0">
+                <a:hlinkClick r:id="rId6"/>
+              </a:rPr>
+              <a:t>http://www.lactogal.pt/contentlist.aspx?menuid=33</a:t>
+            </a:r>
+            <a:endParaRPr lang="pt-PT" sz="600" dirty="0"/>
+          </a:p>
+          <a:p>
+            <a:endParaRPr lang="pt-PT" dirty="0"/>
+          </a:p>
+        </p:txBody>
+      </p:sp>
+      <p:pic>
+        <p:nvPicPr>
+          <p:cNvPr id="9" name="Imagem 8">
+            <a:extLst>
+              <a:ext uri="{FF2B5EF4-FFF2-40B4-BE49-F238E27FC236}">
+                <a16:creationId xmlns:a16="http://schemas.microsoft.com/office/drawing/2014/main" id="{CEFB6B98-D9E3-49BB-B559-09FD28CEC5D4}"/>
+              </a:ext>
+            </a:extLst>
+          </p:cNvPr>
+          <p:cNvPicPr>
+            <a:picLocks noChangeAspect="1"/>
+          </p:cNvPicPr>
+          <p:nvPr/>
+        </p:nvPicPr>
+        <p:blipFill>
+          <a:blip r:embed="rId7"/>
+          <a:stretch>
+            <a:fillRect/>
+          </a:stretch>
+        </p:blipFill>
+        <p:spPr>
+          <a:xfrm>
+            <a:off x="1214437" y="5013176"/>
+            <a:ext cx="6715125" cy="1638300"/>
+          </a:xfrm>
+          <a:prstGeom prst="rect">
+            <a:avLst/>
+          </a:prstGeom>
+        </p:spPr>
+      </p:pic>
+    </p:spTree>
+    <p:extLst>
+      <p:ext uri="{BB962C8B-B14F-4D97-AF65-F5344CB8AC3E}">
+        <p14:creationId xmlns:p14="http://schemas.microsoft.com/office/powerpoint/2010/main" val="3391305899"/>
+      </p:ext>
+    </p:extLst>
+  </p:cSld>
+  <p:clrMapOvr>
+    <a:masterClrMapping/>
+  </p:clrMapOvr>
+</p:sld>
+</file>
+
+<file path=ppt/slides/slide6.xml><?xml version="1.0" encoding="utf-8"?>
+<p:sld xmlns:a="http://schemas.openxmlformats.org/drawingml/2006/main" xmlns:r="http://schemas.openxmlformats.org/officeDocument/2006/relationships" xmlns:p="http://schemas.openxmlformats.org/presentationml/2006/main">
+  <p:cSld>
+    <p:spTree>
+      <p:nvGrpSpPr>
+        <p:cNvPr id="1" name=""/>
+        <p:cNvGrpSpPr/>
+        <p:nvPr/>
+      </p:nvGrpSpPr>
+      <p:grpSpPr>
+        <a:xfrm>
+          <a:off x="0" y="0"/>
+          <a:ext cx="0" cy="0"/>
+          <a:chOff x="0" y="0"/>
+          <a:chExt cx="0" cy="0"/>
+        </a:xfrm>
+      </p:grpSpPr>
+      <p:sp>
+        <p:nvSpPr>
+          <p:cNvPr id="3" name="Marcador de Posição de Conteúdo 2">
+            <a:extLst>
+              <a:ext uri="{FF2B5EF4-FFF2-40B4-BE49-F238E27FC236}">
+                <a16:creationId xmlns:a16="http://schemas.microsoft.com/office/drawing/2014/main" id="{022134FC-9A0A-4169-A456-74C304C17B4C}"/>
+              </a:ext>
+            </a:extLst>
+          </p:cNvPr>
+          <p:cNvSpPr>
+            <a:spLocks noGrp="1"/>
+          </p:cNvSpPr>
+          <p:nvPr>
+            <p:ph idx="1"/>
+          </p:nvPr>
+        </p:nvSpPr>
+        <p:spPr/>
+        <p:txBody>
+          <a:bodyPr>
+            <a:normAutofit/>
+          </a:bodyPr>
+          <a:lstStyle/>
+          <a:p>
+            <a:r>
+              <a:rPr lang="pt-PT" sz="1800" dirty="0"/>
+              <a:t>A EFACEC </a:t>
+            </a:r>
+            <a:r>
+              <a:rPr lang="pt-PT" sz="1800" dirty="0" err="1"/>
+              <a:t>Power</a:t>
+            </a:r>
+            <a:r>
+              <a:rPr lang="pt-PT" sz="1800" dirty="0"/>
+              <a:t> </a:t>
+            </a:r>
+            <a:r>
+              <a:rPr lang="pt-PT" sz="1800" dirty="0" err="1"/>
+              <a:t>Solutions</a:t>
+            </a:r>
+            <a:r>
+              <a:rPr lang="pt-PT" sz="1800" dirty="0"/>
+              <a:t> é uma empresa tecnológica e marca de referência em diversos setores.</a:t>
+            </a:r>
+          </a:p>
+          <a:p>
+            <a:r>
+              <a:rPr lang="pt-PT" sz="1800" dirty="0"/>
+              <a:t>Fundada em 1948, esta firma teve um crescimento acentuado e insustentável, levando à restruturação financeira do grupo.</a:t>
+            </a:r>
+          </a:p>
+          <a:p>
+            <a:r>
+              <a:rPr lang="pt-PT" sz="1800" dirty="0"/>
+              <a:t>Apenas nestes últimos três anos decidiram inovar e focar num portefólio de produtos, construindo fortes parcerias.</a:t>
+            </a:r>
+          </a:p>
+          <a:p>
+            <a:endParaRPr lang="pt-PT" sz="1800" dirty="0"/>
+          </a:p>
+          <a:p>
+            <a:r>
+              <a:rPr lang="pt-PT" sz="1800" dirty="0"/>
+              <a:t>A EFACEC está dividida em três grandes setores:</a:t>
+            </a:r>
+          </a:p>
+          <a:p>
+            <a:pPr lvl="1"/>
+            <a:r>
+              <a:rPr lang="pt-PT" sz="1400" dirty="0"/>
+              <a:t>Produtos de Energia (Transformadores)</a:t>
+            </a:r>
+          </a:p>
+          <a:p>
+            <a:pPr lvl="1"/>
+            <a:r>
+              <a:rPr lang="pt-PT" sz="1400" dirty="0"/>
+              <a:t>Sistemas (Energia/Transportes)</a:t>
+            </a:r>
+          </a:p>
+          <a:p>
+            <a:pPr lvl="1"/>
+            <a:r>
+              <a:rPr lang="pt-PT" sz="1400" dirty="0"/>
+              <a:t>Mobilidade (Mobilidade elétrica)</a:t>
+            </a:r>
+          </a:p>
+          <a:p>
+            <a:endParaRPr lang="pt-PT" sz="1800" dirty="0"/>
+          </a:p>
+        </p:txBody>
+      </p:sp>
+      <p:pic>
+        <p:nvPicPr>
+          <p:cNvPr id="4" name="Imagem 3" descr="640px-EFACEC_logo.svg.png">
+            <a:extLst>
+              <a:ext uri="{FF2B5EF4-FFF2-40B4-BE49-F238E27FC236}">
+                <a16:creationId xmlns:a16="http://schemas.microsoft.com/office/drawing/2014/main" id="{E17A568E-83AE-4A48-B7AC-ED40B0E73C93}"/>
+              </a:ext>
+            </a:extLst>
+          </p:cNvPr>
+          <p:cNvPicPr>
+            <a:picLocks noChangeAspect="1"/>
+          </p:cNvPicPr>
+          <p:nvPr/>
+        </p:nvPicPr>
+        <p:blipFill>
+          <a:blip r:embed="rId2" cstate="print"/>
+          <a:stretch>
+            <a:fillRect/>
+          </a:stretch>
+        </p:blipFill>
+        <p:spPr>
+          <a:xfrm>
+            <a:off x="2412000" y="162449"/>
+            <a:ext cx="4320000" cy="1437751"/>
+          </a:xfrm>
+          <a:prstGeom prst="rect">
+            <a:avLst/>
+          </a:prstGeom>
+        </p:spPr>
+      </p:pic>
+      <p:pic>
+        <p:nvPicPr>
+          <p:cNvPr id="5" name="Imagem 4">
+            <a:extLst>
+              <a:ext uri="{FF2B5EF4-FFF2-40B4-BE49-F238E27FC236}">
+                <a16:creationId xmlns:a16="http://schemas.microsoft.com/office/drawing/2014/main" id="{CC474D32-25DA-4096-AD05-B35F28043374}"/>
+              </a:ext>
+            </a:extLst>
+          </p:cNvPr>
+          <p:cNvPicPr>
+            <a:picLocks noChangeAspect="1"/>
+          </p:cNvPicPr>
+          <p:nvPr/>
+        </p:nvPicPr>
+        <p:blipFill>
+          <a:blip r:embed="rId3" cstate="print">
+            <a:extLst>
+              <a:ext uri="{28A0092B-C50C-407E-A947-70E740481C1C}">
+                <a14:useLocalDpi xmlns:a14="http://schemas.microsoft.com/office/drawing/2010/main" val="0"/>
+              </a:ext>
+            </a:extLst>
+          </a:blip>
+          <a:stretch>
+            <a:fillRect/>
+          </a:stretch>
+        </p:blipFill>
+        <p:spPr>
+          <a:xfrm>
+            <a:off x="894173" y="4941168"/>
+            <a:ext cx="1584176" cy="1744464"/>
+          </a:xfrm>
+          <a:prstGeom prst="rect">
+            <a:avLst/>
+          </a:prstGeom>
+        </p:spPr>
+      </p:pic>
+      <p:pic>
+        <p:nvPicPr>
+          <p:cNvPr id="7" name="Imagem 6">
+            <a:extLst>
+              <a:ext uri="{FF2B5EF4-FFF2-40B4-BE49-F238E27FC236}">
+                <a16:creationId xmlns:a16="http://schemas.microsoft.com/office/drawing/2014/main" id="{4BDF625D-507A-4876-95A6-B381AEE8D043}"/>
+              </a:ext>
+            </a:extLst>
+          </p:cNvPr>
+          <p:cNvPicPr>
+            <a:picLocks noChangeAspect="1"/>
+          </p:cNvPicPr>
+          <p:nvPr/>
+        </p:nvPicPr>
+        <p:blipFill>
+          <a:blip r:embed="rId4" cstate="print">
+            <a:extLst>
+              <a:ext uri="{28A0092B-C50C-407E-A947-70E740481C1C}">
+                <a14:useLocalDpi xmlns:a14="http://schemas.microsoft.com/office/drawing/2010/main" val="0"/>
+              </a:ext>
+            </a:extLst>
+          </a:blip>
+          <a:stretch>
+            <a:fillRect/>
+          </a:stretch>
+        </p:blipFill>
+        <p:spPr>
+          <a:xfrm>
+            <a:off x="2614227" y="4941168"/>
+            <a:ext cx="2325952" cy="1744464"/>
+          </a:xfrm>
+          <a:prstGeom prst="rect">
+            <a:avLst/>
+          </a:prstGeom>
+        </p:spPr>
+      </p:pic>
+      <p:pic>
+        <p:nvPicPr>
+          <p:cNvPr id="9" name="Imagem 8">
+            <a:extLst>
+              <a:ext uri="{FF2B5EF4-FFF2-40B4-BE49-F238E27FC236}">
+                <a16:creationId xmlns:a16="http://schemas.microsoft.com/office/drawing/2014/main" id="{8B35BA05-D73F-4FA2-AEDF-8358E2C69082}"/>
+              </a:ext>
+            </a:extLst>
+          </p:cNvPr>
+          <p:cNvPicPr>
+            <a:picLocks noChangeAspect="1"/>
+          </p:cNvPicPr>
+          <p:nvPr/>
+        </p:nvPicPr>
+        <p:blipFill>
+          <a:blip r:embed="rId5" cstate="print">
+            <a:extLst>
+              <a:ext uri="{28A0092B-C50C-407E-A947-70E740481C1C}">
+                <a14:useLocalDpi xmlns:a14="http://schemas.microsoft.com/office/drawing/2010/main" val="0"/>
+              </a:ext>
+            </a:extLst>
+          </a:blip>
+          <a:stretch>
+            <a:fillRect/>
+          </a:stretch>
+        </p:blipFill>
+        <p:spPr>
+          <a:xfrm>
+            <a:off x="5076056" y="4941168"/>
+            <a:ext cx="3101269" cy="1744464"/>
+          </a:xfrm>
+          <a:prstGeom prst="rect">
+            <a:avLst/>
+          </a:prstGeom>
+        </p:spPr>
+      </p:pic>
+    </p:spTree>
+    <p:extLst>
+      <p:ext uri="{BB962C8B-B14F-4D97-AF65-F5344CB8AC3E}">
+        <p14:creationId xmlns:p14="http://schemas.microsoft.com/office/powerpoint/2010/main" val="273394820"/>
+      </p:ext>
+    </p:extLst>
+  </p:cSld>
+  <p:clrMapOvr>
+    <a:masterClrMapping/>
+  </p:clrMapOvr>
+</p:sld>
+</file>
+
+<file path=ppt/slides/slide7.xml><?xml version="1.0" encoding="utf-8"?>
+<p:sld xmlns:a="http://schemas.openxmlformats.org/drawingml/2006/main" xmlns:r="http://schemas.openxmlformats.org/officeDocument/2006/relationships" xmlns:p="http://schemas.openxmlformats.org/presentationml/2006/main">
+  <p:cSld>
+    <p:spTree>
+      <p:nvGrpSpPr>
+        <p:cNvPr id="1" name=""/>
+        <p:cNvGrpSpPr/>
+        <p:nvPr/>
+      </p:nvGrpSpPr>
+      <p:grpSpPr>
+        <a:xfrm>
+          <a:off x="0" y="0"/>
+          <a:ext cx="0" cy="0"/>
+          <a:chOff x="0" y="0"/>
+          <a:chExt cx="0" cy="0"/>
+        </a:xfrm>
+      </p:grpSpPr>
+      <p:pic>
+        <p:nvPicPr>
+          <p:cNvPr id="9" name="Imagem 8">
+            <a:extLst>
+              <a:ext uri="{FF2B5EF4-FFF2-40B4-BE49-F238E27FC236}">
+                <a16:creationId xmlns:a16="http://schemas.microsoft.com/office/drawing/2014/main" id="{CA1676EB-C70B-49BA-9322-4FECC34B8889}"/>
+              </a:ext>
+            </a:extLst>
+          </p:cNvPr>
+          <p:cNvPicPr>
+            <a:picLocks noChangeAspect="1"/>
+          </p:cNvPicPr>
+          <p:nvPr/>
+        </p:nvPicPr>
+        <p:blipFill>
+          <a:blip r:embed="rId2">
+            <a:extLst>
+              <a:ext uri="{28A0092B-C50C-407E-A947-70E740481C1C}">
+                <a14:useLocalDpi xmlns:a14="http://schemas.microsoft.com/office/drawing/2010/main" val="0"/>
+              </a:ext>
+            </a:extLst>
+          </a:blip>
+          <a:stretch>
+            <a:fillRect/>
+          </a:stretch>
+        </p:blipFill>
+        <p:spPr>
+          <a:xfrm>
+            <a:off x="-1091383" y="0"/>
+            <a:ext cx="11326763" cy="6858000"/>
+          </a:xfrm>
+          <a:prstGeom prst="rect">
+            <a:avLst/>
+          </a:prstGeom>
+        </p:spPr>
+      </p:pic>
+      <p:sp>
+        <p:nvSpPr>
+          <p:cNvPr id="3" name="Marcador de Posição de Conteúdo 2">
+            <a:extLst>
+              <a:ext uri="{FF2B5EF4-FFF2-40B4-BE49-F238E27FC236}">
+                <a16:creationId xmlns:a16="http://schemas.microsoft.com/office/drawing/2014/main" id="{702814F9-3492-40D7-8D95-AD4DD84CDD7F}"/>
+              </a:ext>
+            </a:extLst>
+          </p:cNvPr>
+          <p:cNvSpPr>
+            <a:spLocks noGrp="1"/>
+          </p:cNvSpPr>
+          <p:nvPr>
+            <p:ph idx="1"/>
+          </p:nvPr>
+        </p:nvSpPr>
+        <p:spPr>
+          <a:xfrm>
+            <a:off x="457200" y="2029530"/>
+            <a:ext cx="8229600" cy="4096633"/>
+          </a:xfrm>
+        </p:spPr>
+        <p:txBody>
+          <a:bodyPr>
+            <a:normAutofit/>
+          </a:bodyPr>
+          <a:lstStyle/>
+          <a:p>
+            <a:pPr algn="just"/>
+            <a:r>
+              <a:rPr lang="pt-PT" sz="1800" dirty="0"/>
+              <a:t>Fundada em 1942, a Sogrape é uma das principais empresas de vinhos em Portugal.</a:t>
+            </a:r>
+          </a:p>
+          <a:p>
+            <a:pPr algn="just"/>
+            <a:r>
+              <a:rPr lang="pt-PT" sz="1800" dirty="0"/>
+              <a:t>É proprietária de marcas como </a:t>
+            </a:r>
+            <a:r>
+              <a:rPr lang="pt-PT" sz="1800" dirty="0" err="1"/>
+              <a:t>Sandeman</a:t>
+            </a:r>
+            <a:r>
+              <a:rPr lang="pt-PT" sz="1800" dirty="0"/>
+              <a:t>, Gazela, Ferreira, entre outras.</a:t>
+            </a:r>
+          </a:p>
+          <a:p>
+            <a:pPr algn="just"/>
+            <a:r>
+              <a:rPr lang="pt-PT" sz="1800" dirty="0"/>
+              <a:t>Criador do mais internacional dos vinhos de mesa portugueses - o Mateus Rosé.</a:t>
+            </a:r>
+          </a:p>
+          <a:p>
+            <a:pPr algn="just"/>
+            <a:r>
+              <a:rPr lang="pt-PT" sz="1800" dirty="0"/>
+              <a:t>A Sogrape abrange vários continentes entre os quais América do Sul, Europa e Oceânia, tanto na venda como na sua produção.</a:t>
+            </a:r>
+          </a:p>
+          <a:p>
+            <a:pPr algn="just"/>
+            <a:r>
+              <a:rPr lang="pt-PT" sz="1800" dirty="0"/>
+              <a:t>Reconhecida pelo segundo ano consecutivo como melhor produtora vitivinícola mundial pela WAWJWS, medalhas e outros reconhecimentos que premiaram a qualidade e sustentabilidade.</a:t>
+            </a:r>
+          </a:p>
+          <a:p>
+            <a:pPr algn="just"/>
+            <a:endParaRPr lang="pt-PT" sz="1800" dirty="0"/>
+          </a:p>
+        </p:txBody>
+      </p:sp>
+      <p:pic>
+        <p:nvPicPr>
+          <p:cNvPr id="7" name="Imagem 6">
+            <a:extLst>
+              <a:ext uri="{FF2B5EF4-FFF2-40B4-BE49-F238E27FC236}">
+                <a16:creationId xmlns:a16="http://schemas.microsoft.com/office/drawing/2014/main" id="{1B72A155-D910-402F-B368-A2393F2B8B14}"/>
+              </a:ext>
+            </a:extLst>
+          </p:cNvPr>
+          <p:cNvPicPr>
+            <a:picLocks noChangeAspect="1"/>
+          </p:cNvPicPr>
+          <p:nvPr/>
+        </p:nvPicPr>
+        <p:blipFill>
+          <a:blip r:embed="rId3" cstate="print">
+            <a:extLst>
+              <a:ext uri="{28A0092B-C50C-407E-A947-70E740481C1C}">
+                <a14:useLocalDpi xmlns:a14="http://schemas.microsoft.com/office/drawing/2010/main" val="0"/>
+              </a:ext>
+            </a:extLst>
+          </a:blip>
+          <a:stretch>
+            <a:fillRect/>
+          </a:stretch>
+        </p:blipFill>
+        <p:spPr>
+          <a:xfrm>
+            <a:off x="2906264" y="0"/>
+            <a:ext cx="3331471" cy="2106172"/>
+          </a:xfrm>
+          <a:prstGeom prst="rect">
+            <a:avLst/>
+          </a:prstGeom>
+        </p:spPr>
+      </p:pic>
+      <p:pic>
+        <p:nvPicPr>
+          <p:cNvPr id="19" name="Imagem 18">
+            <a:extLst>
+              <a:ext uri="{FF2B5EF4-FFF2-40B4-BE49-F238E27FC236}">
+                <a16:creationId xmlns:a16="http://schemas.microsoft.com/office/drawing/2014/main" id="{084C849B-5CAD-40F5-81DF-48F467A1AACC}"/>
+              </a:ext>
+            </a:extLst>
+          </p:cNvPr>
+          <p:cNvPicPr>
+            <a:picLocks noChangeAspect="1"/>
+          </p:cNvPicPr>
+          <p:nvPr/>
+        </p:nvPicPr>
+        <p:blipFill>
+          <a:blip r:embed="rId4" cstate="print">
+            <a:extLst>
+              <a:ext uri="{28A0092B-C50C-407E-A947-70E740481C1C}">
+                <a14:useLocalDpi xmlns:a14="http://schemas.microsoft.com/office/drawing/2010/main" val="0"/>
+              </a:ext>
+            </a:extLst>
+          </a:blip>
+          <a:stretch>
+            <a:fillRect/>
+          </a:stretch>
+        </p:blipFill>
+        <p:spPr>
+          <a:xfrm>
+            <a:off x="2740571" y="4965430"/>
+            <a:ext cx="1728192" cy="1728192"/>
+          </a:xfrm>
+          <a:prstGeom prst="rect">
+            <a:avLst/>
+          </a:prstGeom>
+        </p:spPr>
+      </p:pic>
+      <p:pic>
+        <p:nvPicPr>
+          <p:cNvPr id="21" name="Imagem 20">
+            <a:extLst>
+              <a:ext uri="{FF2B5EF4-FFF2-40B4-BE49-F238E27FC236}">
+                <a16:creationId xmlns:a16="http://schemas.microsoft.com/office/drawing/2014/main" id="{F2359456-1385-443A-B1B5-771A464A1250}"/>
+              </a:ext>
+            </a:extLst>
+          </p:cNvPr>
+          <p:cNvPicPr>
+            <a:picLocks noChangeAspect="1"/>
+          </p:cNvPicPr>
+          <p:nvPr/>
+        </p:nvPicPr>
+        <p:blipFill>
+          <a:blip r:embed="rId5" cstate="print">
+            <a:extLst>
+              <a:ext uri="{28A0092B-C50C-407E-A947-70E740481C1C}">
+                <a14:useLocalDpi xmlns:a14="http://schemas.microsoft.com/office/drawing/2010/main" val="0"/>
+              </a:ext>
+            </a:extLst>
+          </a:blip>
+          <a:stretch>
+            <a:fillRect/>
+          </a:stretch>
+        </p:blipFill>
+        <p:spPr>
+          <a:xfrm>
+            <a:off x="5373639" y="4985168"/>
+            <a:ext cx="864096" cy="1728192"/>
+          </a:xfrm>
+          <a:prstGeom prst="rect">
+            <a:avLst/>
+          </a:prstGeom>
+        </p:spPr>
+      </p:pic>
+      <p:pic>
+        <p:nvPicPr>
+          <p:cNvPr id="23" name="Imagem 22">
+            <a:extLst>
+              <a:ext uri="{FF2B5EF4-FFF2-40B4-BE49-F238E27FC236}">
+                <a16:creationId xmlns:a16="http://schemas.microsoft.com/office/drawing/2014/main" id="{5905D2B2-32F7-43EC-81F3-ED7A3B869C7F}"/>
+              </a:ext>
+            </a:extLst>
+          </p:cNvPr>
+          <p:cNvPicPr>
+            <a:picLocks noChangeAspect="1"/>
+          </p:cNvPicPr>
+          <p:nvPr/>
+        </p:nvPicPr>
+        <p:blipFill>
+          <a:blip r:embed="rId6">
+            <a:extLst>
+              <a:ext uri="{28A0092B-C50C-407E-A947-70E740481C1C}">
+                <a14:useLocalDpi xmlns:a14="http://schemas.microsoft.com/office/drawing/2010/main" val="0"/>
+              </a:ext>
+            </a:extLst>
+          </a:blip>
+          <a:stretch>
+            <a:fillRect/>
+          </a:stretch>
+        </p:blipFill>
+        <p:spPr>
+          <a:xfrm>
+            <a:off x="7092281" y="5013176"/>
+            <a:ext cx="1235858" cy="1728192"/>
+          </a:xfrm>
+          <a:prstGeom prst="rect">
+            <a:avLst/>
+          </a:prstGeom>
+        </p:spPr>
+      </p:pic>
+      <p:pic>
+        <p:nvPicPr>
+          <p:cNvPr id="25" name="Imagem 24">
+            <a:extLst>
+              <a:ext uri="{FF2B5EF4-FFF2-40B4-BE49-F238E27FC236}">
+                <a16:creationId xmlns:a16="http://schemas.microsoft.com/office/drawing/2014/main" id="{74FF6420-07CE-4CFF-9F0D-978F46A3E82B}"/>
+              </a:ext>
+            </a:extLst>
+          </p:cNvPr>
+          <p:cNvPicPr>
+            <a:picLocks noChangeAspect="1"/>
+          </p:cNvPicPr>
+          <p:nvPr/>
+        </p:nvPicPr>
+        <p:blipFill>
+          <a:blip r:embed="rId7" cstate="print">
+            <a:extLst>
+              <a:ext uri="{28A0092B-C50C-407E-A947-70E740481C1C}">
+                <a14:useLocalDpi xmlns:a14="http://schemas.microsoft.com/office/drawing/2010/main" val="0"/>
+              </a:ext>
+            </a:extLst>
+          </a:blip>
+          <a:stretch>
+            <a:fillRect/>
+          </a:stretch>
+        </p:blipFill>
+        <p:spPr>
+          <a:xfrm>
+            <a:off x="772450" y="4869160"/>
+            <a:ext cx="1224136" cy="1732307"/>
+          </a:xfrm>
+          <a:prstGeom prst="rect">
+            <a:avLst/>
+          </a:prstGeom>
+        </p:spPr>
+      </p:pic>
+    </p:spTree>
+    <p:extLst>
+      <p:ext uri="{BB962C8B-B14F-4D97-AF65-F5344CB8AC3E}">
+        <p14:creationId xmlns:p14="http://schemas.microsoft.com/office/powerpoint/2010/main" val="3502408882"/>
+      </p:ext>
+    </p:extLst>
+  </p:cSld>
+  <p:clrMapOvr>
+    <a:masterClrMapping/>
+  </p:clrMapOvr>
+</p:sld>
+</file>
+
+<file path=ppt/slides/slide8.xml><?xml version="1.0" encoding="utf-8"?>
+<p:sld xmlns:a="http://schemas.openxmlformats.org/drawingml/2006/main" xmlns:r="http://schemas.openxmlformats.org/officeDocument/2006/relationships" xmlns:p="http://schemas.openxmlformats.org/presentationml/2006/main">
+  <p:cSld>
+    <p:spTree>
+      <p:nvGrpSpPr>
+        <p:cNvPr id="1" name=""/>
+        <p:cNvGrpSpPr/>
+        <p:nvPr/>
+      </p:nvGrpSpPr>
+      <p:grpSpPr>
+        <a:xfrm>
+          <a:off x="0" y="0"/>
+          <a:ext cx="0" cy="0"/>
+          <a:chOff x="0" y="0"/>
+          <a:chExt cx="0" cy="0"/>
+        </a:xfrm>
+      </p:grpSpPr>
+      <p:sp>
+        <p:nvSpPr>
+          <p:cNvPr id="3" name="Marcador de Posição de Conteúdo 2">
+            <a:extLst>
+              <a:ext uri="{FF2B5EF4-FFF2-40B4-BE49-F238E27FC236}">
+                <a16:creationId xmlns:a16="http://schemas.microsoft.com/office/drawing/2014/main" id="{9CE9EDF9-F17E-4508-938A-17F6BBBCA90D}"/>
+              </a:ext>
+            </a:extLst>
+          </p:cNvPr>
+          <p:cNvSpPr>
+            <a:spLocks noGrp="1"/>
+          </p:cNvSpPr>
+          <p:nvPr>
+            <p:ph idx="1"/>
+          </p:nvPr>
+        </p:nvSpPr>
+        <p:spPr>
+          <a:xfrm>
+            <a:off x="457200" y="1700808"/>
+            <a:ext cx="8229600" cy="4425355"/>
+          </a:xfrm>
+        </p:spPr>
+        <p:txBody>
+          <a:bodyPr/>
+          <a:lstStyle/>
+          <a:p>
+            <a:endParaRPr lang="pt-PT" dirty="0"/>
+          </a:p>
+        </p:txBody>
+      </p:sp>
+      <p:pic>
+        <p:nvPicPr>
+          <p:cNvPr id="4" name="Imagem 3" descr="Unicer_official_logo.jpg">
+            <a:extLst>
+              <a:ext uri="{FF2B5EF4-FFF2-40B4-BE49-F238E27FC236}">
+                <a16:creationId xmlns:a16="http://schemas.microsoft.com/office/drawing/2014/main" id="{78BE51EC-638F-4C32-ABA4-AFC19A1941C2}"/>
+              </a:ext>
+            </a:extLst>
+          </p:cNvPr>
+          <p:cNvPicPr>
+            <a:picLocks noChangeAspect="1"/>
+          </p:cNvPicPr>
+          <p:nvPr/>
+        </p:nvPicPr>
+        <p:blipFill>
+          <a:blip r:embed="rId2" cstate="print"/>
+          <a:stretch>
+            <a:fillRect/>
+          </a:stretch>
+        </p:blipFill>
+        <p:spPr>
+          <a:xfrm>
+            <a:off x="3407051" y="0"/>
+            <a:ext cx="2329897" cy="1800000"/>
+          </a:xfrm>
+          <a:prstGeom prst="rect">
+            <a:avLst/>
+          </a:prstGeom>
+        </p:spPr>
+      </p:pic>
+    </p:spTree>
+    <p:extLst>
+      <p:ext uri="{BB962C8B-B14F-4D97-AF65-F5344CB8AC3E}">
+        <p14:creationId xmlns:p14="http://schemas.microsoft.com/office/powerpoint/2010/main" val="2019135696"/>
+      </p:ext>
+    </p:extLst>
+  </p:cSld>
+  <p:clrMapOvr>
+    <a:masterClrMapping/>
+  </p:clrMapOvr>
+</p:sld>
+</file>
+
+<file path=ppt/slides/slide9.xml><?xml version="1.0" encoding="utf-8"?>
+<p:sld xmlns:a="http://schemas.openxmlformats.org/drawingml/2006/main" xmlns:r="http://schemas.openxmlformats.org/officeDocument/2006/relationships" xmlns:p="http://schemas.openxmlformats.org/presentationml/2006/main">
+  <p:cSld>
+    <p:spTree>
+      <p:nvGrpSpPr>
+        <p:cNvPr id="1" name=""/>
+        <p:cNvGrpSpPr/>
+        <p:nvPr/>
+      </p:nvGrpSpPr>
+      <p:grpSpPr>
+        <a:xfrm>
+          <a:off x="0" y="0"/>
+          <a:ext cx="0" cy="0"/>
+          <a:chOff x="0" y="0"/>
+          <a:chExt cx="0" cy="0"/>
+        </a:xfrm>
+      </p:grpSpPr>
+      <p:sp>
+        <p:nvSpPr>
+          <p:cNvPr id="3" name="Marcador de Posição de Conteúdo 2">
+            <a:extLst>
+              <a:ext uri="{FF2B5EF4-FFF2-40B4-BE49-F238E27FC236}">
+                <a16:creationId xmlns:a16="http://schemas.microsoft.com/office/drawing/2014/main" id="{DB013AB8-F5F8-4D11-972E-2ADE4CF98BC7}"/>
+              </a:ext>
+            </a:extLst>
+          </p:cNvPr>
+          <p:cNvSpPr>
+            <a:spLocks noGrp="1"/>
+          </p:cNvSpPr>
+          <p:nvPr>
+            <p:ph idx="1"/>
+          </p:nvPr>
+        </p:nvSpPr>
+        <p:spPr>
+          <a:xfrm>
+            <a:off x="464046" y="1772817"/>
+            <a:ext cx="8229600" cy="3168352"/>
+          </a:xfrm>
+        </p:spPr>
+        <p:txBody>
+          <a:bodyPr>
+            <a:normAutofit/>
+          </a:bodyPr>
+          <a:lstStyle/>
+          <a:p>
+            <a:r>
+              <a:rPr lang="pt-PT" sz="1800" dirty="0"/>
+              <a:t>Empresa do setor de vestuário, fundada em 1996, em plena crise no setor têxtil.</a:t>
+            </a:r>
+          </a:p>
+          <a:p>
+            <a:endParaRPr lang="pt-PT" sz="1800" dirty="0"/>
+          </a:p>
+          <a:p>
+            <a:r>
+              <a:rPr lang="pt-PT" sz="1800" dirty="0"/>
+              <a:t>A sua missão é expandir-se, controlando a produção desde a fiação à tecelagem, passando pela confeção e distribuição.</a:t>
+            </a:r>
+          </a:p>
+          <a:p>
+            <a:endParaRPr lang="pt-PT" sz="1800" dirty="0"/>
+          </a:p>
+          <a:p>
+            <a:r>
+              <a:rPr lang="pt-PT" sz="1800" dirty="0"/>
+              <a:t>Exporta 97% de todos os produtos que fabrica.</a:t>
+            </a:r>
+          </a:p>
+          <a:p>
+            <a:endParaRPr lang="pt-PT" sz="1800" dirty="0"/>
+          </a:p>
+          <a:p>
+            <a:r>
+              <a:rPr lang="pt-PT" sz="1800" dirty="0"/>
+              <a:t>Neste momento é a empresa que maior volume de negócios faz no setor de vestuário em Portugal inteiro.</a:t>
+            </a:r>
+          </a:p>
+        </p:txBody>
+      </p:sp>
+      <p:pic>
+        <p:nvPicPr>
+          <p:cNvPr id="4" name="Imagem 3" descr="polipique.png">
+            <a:extLst>
+              <a:ext uri="{FF2B5EF4-FFF2-40B4-BE49-F238E27FC236}">
+                <a16:creationId xmlns:a16="http://schemas.microsoft.com/office/drawing/2014/main" id="{00665AD8-BF12-420F-B6F6-EC07916C33A2}"/>
+              </a:ext>
+            </a:extLst>
+          </p:cNvPr>
+          <p:cNvPicPr>
+            <a:picLocks noChangeAspect="1"/>
+          </p:cNvPicPr>
+          <p:nvPr/>
+        </p:nvPicPr>
+        <p:blipFill>
+          <a:blip r:embed="rId2" cstate="print"/>
+          <a:stretch>
+            <a:fillRect/>
+          </a:stretch>
+        </p:blipFill>
+        <p:spPr>
+          <a:xfrm>
+            <a:off x="2412000" y="137269"/>
+            <a:ext cx="4320000" cy="1563539"/>
+          </a:xfrm>
+          <a:prstGeom prst="rect">
+            <a:avLst/>
+          </a:prstGeom>
+        </p:spPr>
+      </p:pic>
+      <p:pic>
+        <p:nvPicPr>
+          <p:cNvPr id="5" name="Imagem 4">
+            <a:extLst>
+              <a:ext uri="{FF2B5EF4-FFF2-40B4-BE49-F238E27FC236}">
+                <a16:creationId xmlns:a16="http://schemas.microsoft.com/office/drawing/2014/main" id="{E68A4EEE-2446-41C8-BD4E-1E2F6883714B}"/>
+              </a:ext>
+            </a:extLst>
+          </p:cNvPr>
+          <p:cNvPicPr>
+            <a:picLocks noChangeAspect="1"/>
+          </p:cNvPicPr>
+          <p:nvPr/>
+        </p:nvPicPr>
+        <p:blipFill>
+          <a:blip r:embed="rId3">
+            <a:extLst>
+              <a:ext uri="{28A0092B-C50C-407E-A947-70E740481C1C}">
+                <a14:useLocalDpi xmlns:a14="http://schemas.microsoft.com/office/drawing/2010/main" val="0"/>
+              </a:ext>
+            </a:extLst>
+          </a:blip>
+          <a:stretch>
+            <a:fillRect/>
+          </a:stretch>
+        </p:blipFill>
+        <p:spPr>
+          <a:xfrm>
+            <a:off x="376887" y="4941168"/>
+            <a:ext cx="4070226" cy="1582866"/>
+          </a:xfrm>
+          <a:prstGeom prst="rect">
+            <a:avLst/>
+          </a:prstGeom>
+        </p:spPr>
+      </p:pic>
+      <p:pic>
+        <p:nvPicPr>
+          <p:cNvPr id="7" name="Imagem 6">
+            <a:extLst>
+              <a:ext uri="{FF2B5EF4-FFF2-40B4-BE49-F238E27FC236}">
+                <a16:creationId xmlns:a16="http://schemas.microsoft.com/office/drawing/2014/main" id="{5CFD7BD3-5424-4A3F-9D14-A0FE09FFA1E2}"/>
+              </a:ext>
+            </a:extLst>
+          </p:cNvPr>
+          <p:cNvPicPr>
+            <a:picLocks noChangeAspect="1"/>
+          </p:cNvPicPr>
+          <p:nvPr/>
+        </p:nvPicPr>
+        <p:blipFill>
+          <a:blip r:embed="rId4">
+            <a:extLst>
+              <a:ext uri="{28A0092B-C50C-407E-A947-70E740481C1C}">
+                <a14:useLocalDpi xmlns:a14="http://schemas.microsoft.com/office/drawing/2010/main" val="0"/>
+              </a:ext>
+            </a:extLst>
+          </a:blip>
+          <a:stretch>
+            <a:fillRect/>
+          </a:stretch>
+        </p:blipFill>
+        <p:spPr>
+          <a:xfrm>
+            <a:off x="4578052" y="4941168"/>
+            <a:ext cx="4114800" cy="1582866"/>
+          </a:xfrm>
+          <a:prstGeom prst="rect">
+            <a:avLst/>
+          </a:prstGeom>
+        </p:spPr>
+      </p:pic>
+    </p:spTree>
+    <p:extLst>
+      <p:ext uri="{BB962C8B-B14F-4D97-AF65-F5344CB8AC3E}">
+        <p14:creationId xmlns:p14="http://schemas.microsoft.com/office/powerpoint/2010/main" val="852197523"/>
+      </p:ext>
+    </p:extLst>
+  </p:cSld>
+  <p:clrMapOvr>
+    <a:masterClrMapping/>
+  </p:clrMapOvr>
 </p:sld>
 </file>
 

</xml_diff>